<commit_message>
Update De La Riva, Bennett, Calhoun, Young; Tax_Boss.pptx
</commit_message>
<xml_diff>
--- a/De La Riva, Bennett, Calhoun, Young; Tax_Boss.pptx
+++ b/De La Riva, Bennett, Calhoun, Young; Tax_Boss.pptx
@@ -11,6 +11,7 @@
     <p:sldId id="259" r:id="rId5"/>
     <p:sldId id="260" r:id="rId6"/>
     <p:sldId id="261" r:id="rId7"/>
+    <p:sldId id="262" r:id="rId8"/>
   </p:sldIdLst>
   <p:sldSz cx="12192000" cy="6858000"/>
   <p:notesSz cx="6858000" cy="9144000"/>
@@ -6673,7 +6674,37 @@
           <a:bodyPr/>
           <a:lstStyle/>
           <a:p>
-            <a:endParaRPr lang="en-US"/>
+            <a:r>
+              <a:rPr lang="en-US" dirty="0"/>
+              <a:t>Summary of requirements</a:t>
+            </a:r>
+          </a:p>
+          <a:p>
+            <a:r>
+              <a:rPr lang="en-US" dirty="0"/>
+              <a:t>Calhoun- Billing</a:t>
+            </a:r>
+          </a:p>
+          <a:p>
+            <a:r>
+              <a:rPr lang="en-US" dirty="0"/>
+              <a:t>Dante-</a:t>
+            </a:r>
+          </a:p>
+          <a:p>
+            <a:r>
+              <a:rPr lang="en-US" dirty="0"/>
+              <a:t>Shaun-</a:t>
+            </a:r>
+          </a:p>
+          <a:p>
+            <a:r>
+              <a:rPr lang="en-US" dirty="0"/>
+              <a:t>Kincaid-</a:t>
+            </a:r>
+          </a:p>
+          <a:p>
+            <a:endParaRPr lang="en-US" dirty="0"/>
           </a:p>
         </p:txBody>
       </p:sp>
@@ -6808,7 +6839,10 @@
           <a:bodyPr/>
           <a:lstStyle/>
           <a:p>
-            <a:endParaRPr lang="en-US"/>
+            <a:r>
+              <a:rPr lang="en-US" dirty="0"/>
+              <a:t>Cost, almost last slide</a:t>
+            </a:r>
           </a:p>
         </p:txBody>
       </p:sp>
@@ -6841,6 +6875,89 @@
     <p:extLst>
       <p:ext uri="{BB962C8B-B14F-4D97-AF65-F5344CB8AC3E}">
         <p14:creationId xmlns:p14="http://schemas.microsoft.com/office/powerpoint/2010/main" val="625277202"/>
+      </p:ext>
+    </p:extLst>
+  </p:cSld>
+  <p:clrMapOvr>
+    <a:masterClrMapping/>
+  </p:clrMapOvr>
+</p:sld>
+</file>
+
+<file path=ppt/slides/slide7.xml><?xml version="1.0" encoding="utf-8"?>
+<p:sld xmlns:a="http://schemas.openxmlformats.org/drawingml/2006/main" xmlns:r="http://schemas.openxmlformats.org/officeDocument/2006/relationships" xmlns:p="http://schemas.openxmlformats.org/presentationml/2006/main">
+  <p:cSld>
+    <p:spTree>
+      <p:nvGrpSpPr>
+        <p:cNvPr id="1" name=""/>
+        <p:cNvGrpSpPr/>
+        <p:nvPr/>
+      </p:nvGrpSpPr>
+      <p:grpSpPr>
+        <a:xfrm>
+          <a:off x="0" y="0"/>
+          <a:ext cx="0" cy="0"/>
+          <a:chOff x="0" y="0"/>
+          <a:chExt cx="0" cy="0"/>
+        </a:xfrm>
+      </p:grpSpPr>
+      <p:sp>
+        <p:nvSpPr>
+          <p:cNvPr id="2" name="Title 1">
+            <a:extLst>
+              <a:ext uri="{FF2B5EF4-FFF2-40B4-BE49-F238E27FC236}">
+                <a16:creationId xmlns:a16="http://schemas.microsoft.com/office/drawing/2014/main" id="{F63F2CE9-287D-4D36-B359-CD02F2E6C9B3}"/>
+              </a:ext>
+            </a:extLst>
+          </p:cNvPr>
+          <p:cNvSpPr>
+            <a:spLocks noGrp="1"/>
+          </p:cNvSpPr>
+          <p:nvPr>
+            <p:ph type="title"/>
+          </p:nvPr>
+        </p:nvSpPr>
+        <p:spPr/>
+        <p:txBody>
+          <a:bodyPr/>
+          <a:lstStyle/>
+          <a:p>
+            <a:r>
+              <a:rPr lang="en-US" dirty="0"/>
+              <a:t>conclusion</a:t>
+            </a:r>
+          </a:p>
+        </p:txBody>
+      </p:sp>
+      <p:sp>
+        <p:nvSpPr>
+          <p:cNvPr id="3" name="Content Placeholder 2">
+            <a:extLst>
+              <a:ext uri="{FF2B5EF4-FFF2-40B4-BE49-F238E27FC236}">
+                <a16:creationId xmlns:a16="http://schemas.microsoft.com/office/drawing/2014/main" id="{E19053FB-A14B-4A08-B297-0D18C9170EEF}"/>
+              </a:ext>
+            </a:extLst>
+          </p:cNvPr>
+          <p:cNvSpPr>
+            <a:spLocks noGrp="1"/>
+          </p:cNvSpPr>
+          <p:nvPr>
+            <p:ph idx="1"/>
+          </p:nvPr>
+        </p:nvSpPr>
+        <p:spPr/>
+        <p:txBody>
+          <a:bodyPr/>
+          <a:lstStyle/>
+          <a:p>
+            <a:endParaRPr lang="en-US"/>
+          </a:p>
+        </p:txBody>
+      </p:sp>
+    </p:spTree>
+    <p:extLst>
+      <p:ext uri="{BB962C8B-B14F-4D97-AF65-F5344CB8AC3E}">
+        <p14:creationId xmlns:p14="http://schemas.microsoft.com/office/powerpoint/2010/main" val="3964379491"/>
       </p:ext>
     </p:extLst>
   </p:cSld>

</xml_diff>

<commit_message>
Create simple conclusion slide
</commit_message>
<xml_diff>
--- a/De La Riva, Bennett, Calhoun, Young; Tax_Boss.pptx
+++ b/De La Riva, Bennett, Calhoun, Young; Tax_Boss.pptx
@@ -13,10 +13,9 @@
     <p:sldId id="260" r:id="rId7"/>
     <p:sldId id="269" r:id="rId8"/>
     <p:sldId id="265" r:id="rId9"/>
-    <p:sldId id="270" r:id="rId10"/>
-    <p:sldId id="261" r:id="rId11"/>
-    <p:sldId id="271" r:id="rId12"/>
-    <p:sldId id="262" r:id="rId13"/>
+    <p:sldId id="261" r:id="rId10"/>
+    <p:sldId id="271" r:id="rId11"/>
+    <p:sldId id="262" r:id="rId12"/>
   </p:sldIdLst>
   <p:sldSz cx="12192000" cy="6858000"/>
   <p:notesSz cx="6858000" cy="9144000"/>
@@ -15718,1797 +15717,6 @@
           <p:cNvPr id="2" name="Title 1">
             <a:extLst>
               <a:ext uri="{FF2B5EF4-FFF2-40B4-BE49-F238E27FC236}">
-                <a16:creationId xmlns:a16="http://schemas.microsoft.com/office/drawing/2014/main" id="{8E57C0AE-340B-4DEF-A2AB-3C6195B79004}"/>
-              </a:ext>
-            </a:extLst>
-          </p:cNvPr>
-          <p:cNvSpPr>
-            <a:spLocks noGrp="1"/>
-          </p:cNvSpPr>
-          <p:nvPr>
-            <p:ph type="title"/>
-          </p:nvPr>
-        </p:nvSpPr>
-        <p:spPr/>
-        <p:txBody>
-          <a:bodyPr/>
-          <a:lstStyle/>
-          <a:p>
-            <a:r>
-              <a:rPr lang="en-US" dirty="0"/>
-              <a:t>Cost</a:t>
-            </a:r>
-          </a:p>
-        </p:txBody>
-      </p:sp>
-      <p:graphicFrame>
-        <p:nvGraphicFramePr>
-          <p:cNvPr id="4" name="Table 4">
-            <a:extLst>
-              <a:ext uri="{FF2B5EF4-FFF2-40B4-BE49-F238E27FC236}">
-                <a16:creationId xmlns:a16="http://schemas.microsoft.com/office/drawing/2014/main" id="{9C6889DD-01A3-489A-9773-26A6933CCA6B}"/>
-              </a:ext>
-            </a:extLst>
-          </p:cNvPr>
-          <p:cNvGraphicFramePr>
-            <a:graphicFrameLocks noGrp="1"/>
-          </p:cNvGraphicFramePr>
-          <p:nvPr>
-            <p:ph idx="1"/>
-            <p:extLst>
-              <p:ext uri="{D42A27DB-BD31-4B8C-83A1-F6EECF244321}">
-                <p14:modId xmlns:p14="http://schemas.microsoft.com/office/powerpoint/2010/main" val="2576805687"/>
-              </p:ext>
-            </p:extLst>
-          </p:nvPr>
-        </p:nvGraphicFramePr>
-        <p:xfrm>
-          <a:off x="1484313" y="2183920"/>
-          <a:ext cx="10018708" cy="3708400"/>
-        </p:xfrm>
-        <a:graphic>
-          <a:graphicData uri="http://schemas.openxmlformats.org/drawingml/2006/table">
-            <a:tbl>
-              <a:tblPr firstRow="1" bandRow="1">
-                <a:tableStyleId>{9D7B26C5-4107-4FEC-AEDC-1716B250A1EF}</a:tableStyleId>
-              </a:tblPr>
-              <a:tblGrid>
-                <a:gridCol w="2003742">
-                  <a:extLst>
-                    <a:ext uri="{9D8B030D-6E8A-4147-A177-3AD203B41FA5}">
-                      <a16:colId xmlns:a16="http://schemas.microsoft.com/office/drawing/2014/main" val="1769105935"/>
-                    </a:ext>
-                  </a:extLst>
-                </a:gridCol>
-                <a:gridCol w="3870277">
-                  <a:extLst>
-                    <a:ext uri="{9D8B030D-6E8A-4147-A177-3AD203B41FA5}">
-                      <a16:colId xmlns:a16="http://schemas.microsoft.com/office/drawing/2014/main" val="2208315416"/>
-                    </a:ext>
-                  </a:extLst>
-                </a:gridCol>
-                <a:gridCol w="1381563">
-                  <a:extLst>
-                    <a:ext uri="{9D8B030D-6E8A-4147-A177-3AD203B41FA5}">
-                      <a16:colId xmlns:a16="http://schemas.microsoft.com/office/drawing/2014/main" val="992169908"/>
-                    </a:ext>
-                  </a:extLst>
-                </a:gridCol>
-                <a:gridCol w="1381563">
-                  <a:extLst>
-                    <a:ext uri="{9D8B030D-6E8A-4147-A177-3AD203B41FA5}">
-                      <a16:colId xmlns:a16="http://schemas.microsoft.com/office/drawing/2014/main" val="1588478479"/>
-                    </a:ext>
-                  </a:extLst>
-                </a:gridCol>
-                <a:gridCol w="1381563">
-                  <a:extLst>
-                    <a:ext uri="{9D8B030D-6E8A-4147-A177-3AD203B41FA5}">
-                      <a16:colId xmlns:a16="http://schemas.microsoft.com/office/drawing/2014/main" val="3658203024"/>
-                    </a:ext>
-                  </a:extLst>
-                </a:gridCol>
-              </a:tblGrid>
-              <a:tr h="370840">
-                <a:tc>
-                  <a:txBody>
-                    <a:bodyPr/>
-                    <a:lstStyle/>
-                    <a:p>
-                      <a:r>
-                        <a:rPr lang="en-US" dirty="0"/>
-                        <a:t>External Cost</a:t>
-                      </a:r>
-                    </a:p>
-                  </a:txBody>
-                  <a:tcPr>
-                    <a:lnL w="12700" cap="flat" cmpd="sng" algn="ctr">
-                      <a:solidFill>
-                        <a:schemeClr val="tx1"/>
-                      </a:solidFill>
-                      <a:prstDash val="solid"/>
-                      <a:round/>
-                      <a:headEnd type="none" w="med" len="med"/>
-                      <a:tailEnd type="none" w="med" len="med"/>
-                    </a:lnL>
-                  </a:tcPr>
-                </a:tc>
-                <a:tc>
-                  <a:txBody>
-                    <a:bodyPr/>
-                    <a:lstStyle/>
-                    <a:p>
-                      <a:r>
-                        <a:rPr lang="en-US" dirty="0"/>
-                        <a:t>Purpose</a:t>
-                      </a:r>
-                    </a:p>
-                  </a:txBody>
-                  <a:tcPr/>
-                </a:tc>
-                <a:tc>
-                  <a:txBody>
-                    <a:bodyPr/>
-                    <a:lstStyle/>
-                    <a:p>
-                      <a:r>
-                        <a:rPr lang="en-US" dirty="0"/>
-                        <a:t>Price Year 1</a:t>
-                      </a:r>
-                    </a:p>
-                  </a:txBody>
-                  <a:tcPr/>
-                </a:tc>
-                <a:tc>
-                  <a:txBody>
-                    <a:bodyPr/>
-                    <a:lstStyle/>
-                    <a:p>
-                      <a:r>
-                        <a:rPr lang="en-US" dirty="0"/>
-                        <a:t>Price Year 2</a:t>
-                      </a:r>
-                    </a:p>
-                  </a:txBody>
-                  <a:tcPr/>
-                </a:tc>
-                <a:tc>
-                  <a:txBody>
-                    <a:bodyPr/>
-                    <a:lstStyle/>
-                    <a:p>
-                      <a:r>
-                        <a:rPr lang="en-US" dirty="0"/>
-                        <a:t>Price Year 3</a:t>
-                      </a:r>
-                    </a:p>
-                  </a:txBody>
-                  <a:tcPr>
-                    <a:lnR w="12700" cap="flat" cmpd="sng" algn="ctr">
-                      <a:solidFill>
-                        <a:schemeClr val="tx1"/>
-                      </a:solidFill>
-                      <a:prstDash val="solid"/>
-                      <a:round/>
-                      <a:headEnd type="none" w="med" len="med"/>
-                      <a:tailEnd type="none" w="med" len="med"/>
-                    </a:lnR>
-                  </a:tcPr>
-                </a:tc>
-                <a:extLst>
-                  <a:ext uri="{0D108BD9-81ED-4DB2-BD59-A6C34878D82A}">
-                    <a16:rowId xmlns:a16="http://schemas.microsoft.com/office/drawing/2014/main" val="3966015360"/>
-                  </a:ext>
-                </a:extLst>
-              </a:tr>
-              <a:tr h="370840">
-                <a:tc>
-                  <a:txBody>
-                    <a:bodyPr/>
-                    <a:lstStyle/>
-                    <a:p>
-                      <a:r>
-                        <a:rPr lang="en-US" dirty="0"/>
-                        <a:t>Google Workspace</a:t>
-                      </a:r>
-                    </a:p>
-                  </a:txBody>
-                  <a:tcPr>
-                    <a:lnL w="12700" cap="flat" cmpd="sng" algn="ctr">
-                      <a:solidFill>
-                        <a:schemeClr val="tx1"/>
-                      </a:solidFill>
-                      <a:prstDash val="solid"/>
-                      <a:round/>
-                      <a:headEnd type="none" w="med" len="med"/>
-                      <a:tailEnd type="none" w="med" len="med"/>
-                    </a:lnL>
-                  </a:tcPr>
-                </a:tc>
-                <a:tc>
-                  <a:txBody>
-                    <a:bodyPr/>
-                    <a:lstStyle/>
-                    <a:p>
-                      <a:r>
-                        <a:rPr lang="en-US" dirty="0"/>
-                        <a:t>Document Transfer</a:t>
-                      </a:r>
-                    </a:p>
-                  </a:txBody>
-                  <a:tcPr/>
-                </a:tc>
-                <a:tc>
-                  <a:txBody>
-                    <a:bodyPr/>
-                    <a:lstStyle/>
-                    <a:p>
-                      <a:pPr algn="r" rtl="0" fontAlgn="b"/>
-                      <a:r>
-                        <a:rPr lang="en-US">
-                          <a:effectLst/>
-                        </a:rPr>
-                        <a:t>$144</a:t>
-                      </a:r>
-                    </a:p>
-                  </a:txBody>
-                  <a:tcPr marL="28575" marR="28575" marT="19050" marB="19050" anchor="b"/>
-                </a:tc>
-                <a:tc>
-                  <a:txBody>
-                    <a:bodyPr/>
-                    <a:lstStyle/>
-                    <a:p>
-                      <a:pPr algn="r" rtl="0" fontAlgn="b"/>
-                      <a:r>
-                        <a:rPr lang="en-US">
-                          <a:effectLst/>
-                        </a:rPr>
-                        <a:t>$144</a:t>
-                      </a:r>
-                    </a:p>
-                  </a:txBody>
-                  <a:tcPr marL="28575" marR="28575" marT="19050" marB="19050" anchor="b"/>
-                </a:tc>
-                <a:tc>
-                  <a:txBody>
-                    <a:bodyPr/>
-                    <a:lstStyle/>
-                    <a:p>
-                      <a:pPr algn="r" rtl="0" fontAlgn="b"/>
-                      <a:r>
-                        <a:rPr lang="en-US" dirty="0">
-                          <a:effectLst/>
-                        </a:rPr>
-                        <a:t>$144</a:t>
-                      </a:r>
-                    </a:p>
-                  </a:txBody>
-                  <a:tcPr marL="28575" marR="28575" marT="19050" marB="19050" anchor="b">
-                    <a:lnR w="12700" cap="flat" cmpd="sng" algn="ctr">
-                      <a:solidFill>
-                        <a:schemeClr val="tx1"/>
-                      </a:solidFill>
-                      <a:prstDash val="solid"/>
-                      <a:round/>
-                      <a:headEnd type="none" w="med" len="med"/>
-                      <a:tailEnd type="none" w="med" len="med"/>
-                    </a:lnR>
-                  </a:tcPr>
-                </a:tc>
-                <a:extLst>
-                  <a:ext uri="{0D108BD9-81ED-4DB2-BD59-A6C34878D82A}">
-                    <a16:rowId xmlns:a16="http://schemas.microsoft.com/office/drawing/2014/main" val="2072116671"/>
-                  </a:ext>
-                </a:extLst>
-              </a:tr>
-              <a:tr h="370840">
-                <a:tc>
-                  <a:txBody>
-                    <a:bodyPr/>
-                    <a:lstStyle/>
-                    <a:p>
-                      <a:pPr rtl="0" fontAlgn="b"/>
-                      <a:r>
-                        <a:rPr lang="en-US" dirty="0" err="1">
-                          <a:effectLst/>
-                        </a:rPr>
-                        <a:t>BigTime</a:t>
-                      </a:r>
-                      <a:r>
-                        <a:rPr lang="en-US" dirty="0">
-                          <a:effectLst/>
-                        </a:rPr>
-                        <a:t> (Pro)</a:t>
-                      </a:r>
-                    </a:p>
-                  </a:txBody>
-                  <a:tcPr marL="28575" marR="28575" marT="19050" marB="19050" anchor="b">
-                    <a:lnL w="12700" cap="flat" cmpd="sng" algn="ctr">
-                      <a:solidFill>
-                        <a:schemeClr val="tx1"/>
-                      </a:solidFill>
-                      <a:prstDash val="solid"/>
-                      <a:round/>
-                      <a:headEnd type="none" w="med" len="med"/>
-                      <a:tailEnd type="none" w="med" len="med"/>
-                    </a:lnL>
-                  </a:tcPr>
-                </a:tc>
-                <a:tc>
-                  <a:txBody>
-                    <a:bodyPr/>
-                    <a:lstStyle/>
-                    <a:p>
-                      <a:pPr rtl="0" fontAlgn="b"/>
-                      <a:r>
-                        <a:rPr lang="en-US">
-                          <a:effectLst/>
-                        </a:rPr>
-                        <a:t>Time Keeping, Billing, Notifications</a:t>
-                      </a:r>
-                    </a:p>
-                  </a:txBody>
-                  <a:tcPr marL="28575" marR="28575" marT="19050" marB="19050" anchor="b"/>
-                </a:tc>
-                <a:tc>
-                  <a:txBody>
-                    <a:bodyPr/>
-                    <a:lstStyle/>
-                    <a:p>
-                      <a:pPr algn="r" rtl="0" fontAlgn="b"/>
-                      <a:r>
-                        <a:rPr lang="en-US">
-                          <a:effectLst/>
-                        </a:rPr>
-                        <a:t>$1,800</a:t>
-                      </a:r>
-                    </a:p>
-                  </a:txBody>
-                  <a:tcPr marL="28575" marR="28575" marT="19050" marB="19050" anchor="b"/>
-                </a:tc>
-                <a:tc>
-                  <a:txBody>
-                    <a:bodyPr/>
-                    <a:lstStyle/>
-                    <a:p>
-                      <a:pPr algn="r" rtl="0" fontAlgn="b"/>
-                      <a:r>
-                        <a:rPr lang="en-US" dirty="0">
-                          <a:effectLst/>
-                        </a:rPr>
-                        <a:t>$1,800</a:t>
-                      </a:r>
-                    </a:p>
-                  </a:txBody>
-                  <a:tcPr marL="28575" marR="28575" marT="19050" marB="19050" anchor="b"/>
-                </a:tc>
-                <a:tc>
-                  <a:txBody>
-                    <a:bodyPr/>
-                    <a:lstStyle/>
-                    <a:p>
-                      <a:pPr algn="r" rtl="0" fontAlgn="b"/>
-                      <a:r>
-                        <a:rPr lang="en-US" dirty="0">
-                          <a:effectLst/>
-                        </a:rPr>
-                        <a:t>$1,800</a:t>
-                      </a:r>
-                    </a:p>
-                  </a:txBody>
-                  <a:tcPr marL="28575" marR="28575" marT="19050" marB="19050" anchor="b">
-                    <a:lnR w="12700" cap="flat" cmpd="sng" algn="ctr">
-                      <a:solidFill>
-                        <a:schemeClr val="tx1"/>
-                      </a:solidFill>
-                      <a:prstDash val="solid"/>
-                      <a:round/>
-                      <a:headEnd type="none" w="med" len="med"/>
-                      <a:tailEnd type="none" w="med" len="med"/>
-                    </a:lnR>
-                  </a:tcPr>
-                </a:tc>
-                <a:extLst>
-                  <a:ext uri="{0D108BD9-81ED-4DB2-BD59-A6C34878D82A}">
-                    <a16:rowId xmlns:a16="http://schemas.microsoft.com/office/drawing/2014/main" val="2320253476"/>
-                  </a:ext>
-                </a:extLst>
-              </a:tr>
-              <a:tr h="370840">
-                <a:tc>
-                  <a:txBody>
-                    <a:bodyPr/>
-                    <a:lstStyle/>
-                    <a:p>
-                      <a:pPr rtl="0" fontAlgn="b"/>
-                      <a:r>
-                        <a:rPr lang="en-US" dirty="0" err="1">
-                          <a:effectLst/>
-                        </a:rPr>
-                        <a:t>Shookum</a:t>
-                      </a:r>
-                      <a:endParaRPr lang="en-US" dirty="0">
-                        <a:effectLst/>
-                      </a:endParaRPr>
-                    </a:p>
-                  </a:txBody>
-                  <a:tcPr marL="28575" marR="28575" marT="19050" marB="19050" anchor="b">
-                    <a:lnL w="12700" cap="flat" cmpd="sng" algn="ctr">
-                      <a:solidFill>
-                        <a:schemeClr val="tx1"/>
-                      </a:solidFill>
-                      <a:prstDash val="solid"/>
-                      <a:round/>
-                      <a:headEnd type="none" w="med" len="med"/>
-                      <a:tailEnd type="none" w="med" len="med"/>
-                    </a:lnL>
-                  </a:tcPr>
-                </a:tc>
-                <a:tc>
-                  <a:txBody>
-                    <a:bodyPr/>
-                    <a:lstStyle/>
-                    <a:p>
-                      <a:pPr rtl="0" fontAlgn="b"/>
-                      <a:r>
-                        <a:rPr lang="en-US">
-                          <a:effectLst/>
-                        </a:rPr>
-                        <a:t>Advertisement Creation</a:t>
-                      </a:r>
-                    </a:p>
-                  </a:txBody>
-                  <a:tcPr marL="28575" marR="28575" marT="19050" marB="19050" anchor="b"/>
-                </a:tc>
-                <a:tc>
-                  <a:txBody>
-                    <a:bodyPr/>
-                    <a:lstStyle/>
-                    <a:p>
-                      <a:pPr algn="r" rtl="0" fontAlgn="b"/>
-                      <a:r>
-                        <a:rPr lang="en-US">
-                          <a:effectLst/>
-                        </a:rPr>
-                        <a:t>$3,000</a:t>
-                      </a:r>
-                    </a:p>
-                  </a:txBody>
-                  <a:tcPr marL="28575" marR="28575" marT="19050" marB="19050" anchor="b"/>
-                </a:tc>
-                <a:tc>
-                  <a:txBody>
-                    <a:bodyPr/>
-                    <a:lstStyle/>
-                    <a:p>
-                      <a:pPr algn="r" rtl="0" fontAlgn="b"/>
-                      <a:r>
-                        <a:rPr lang="en-US" dirty="0">
-                          <a:effectLst/>
-                        </a:rPr>
-                        <a:t>$2,000</a:t>
-                      </a:r>
-                    </a:p>
-                  </a:txBody>
-                  <a:tcPr marL="28575" marR="28575" marT="19050" marB="19050" anchor="b"/>
-                </a:tc>
-                <a:tc>
-                  <a:txBody>
-                    <a:bodyPr/>
-                    <a:lstStyle/>
-                    <a:p>
-                      <a:pPr algn="r" rtl="0" fontAlgn="b"/>
-                      <a:r>
-                        <a:rPr lang="en-US" dirty="0">
-                          <a:effectLst/>
-                        </a:rPr>
-                        <a:t>$2,000</a:t>
-                      </a:r>
-                    </a:p>
-                  </a:txBody>
-                  <a:tcPr marL="28575" marR="28575" marT="19050" marB="19050" anchor="b">
-                    <a:lnR w="12700" cap="flat" cmpd="sng" algn="ctr">
-                      <a:solidFill>
-                        <a:schemeClr val="tx1"/>
-                      </a:solidFill>
-                      <a:prstDash val="solid"/>
-                      <a:round/>
-                      <a:headEnd type="none" w="med" len="med"/>
-                      <a:tailEnd type="none" w="med" len="med"/>
-                    </a:lnR>
-                  </a:tcPr>
-                </a:tc>
-                <a:extLst>
-                  <a:ext uri="{0D108BD9-81ED-4DB2-BD59-A6C34878D82A}">
-                    <a16:rowId xmlns:a16="http://schemas.microsoft.com/office/drawing/2014/main" val="2618246687"/>
-                  </a:ext>
-                </a:extLst>
-              </a:tr>
-              <a:tr h="370840">
-                <a:tc>
-                  <a:txBody>
-                    <a:bodyPr/>
-                    <a:lstStyle/>
-                    <a:p>
-                      <a:pPr rtl="0" fontAlgn="b"/>
-                      <a:r>
-                        <a:rPr lang="en-US" dirty="0">
-                          <a:effectLst/>
-                        </a:rPr>
-                        <a:t>Meta Advertising</a:t>
-                      </a:r>
-                    </a:p>
-                  </a:txBody>
-                  <a:tcPr marL="28575" marR="28575" marT="19050" marB="19050" anchor="b">
-                    <a:lnL w="12700" cap="flat" cmpd="sng" algn="ctr">
-                      <a:solidFill>
-                        <a:schemeClr val="tx1"/>
-                      </a:solidFill>
-                      <a:prstDash val="solid"/>
-                      <a:round/>
-                      <a:headEnd type="none" w="med" len="med"/>
-                      <a:tailEnd type="none" w="med" len="med"/>
-                    </a:lnL>
-                    <a:lnB w="12700" cap="flat" cmpd="sng" algn="ctr">
-                      <a:solidFill>
-                        <a:schemeClr val="tx1"/>
-                      </a:solidFill>
-                      <a:prstDash val="solid"/>
-                      <a:round/>
-                      <a:headEnd type="none" w="med" len="med"/>
-                      <a:tailEnd type="none" w="med" len="med"/>
-                    </a:lnB>
-                  </a:tcPr>
-                </a:tc>
-                <a:tc>
-                  <a:txBody>
-                    <a:bodyPr/>
-                    <a:lstStyle/>
-                    <a:p>
-                      <a:pPr rtl="0" fontAlgn="b"/>
-                      <a:r>
-                        <a:rPr lang="en-US" dirty="0">
-                          <a:effectLst/>
-                        </a:rPr>
-                        <a:t>Advertisement Display</a:t>
-                      </a:r>
-                    </a:p>
-                  </a:txBody>
-                  <a:tcPr marL="28575" marR="28575" marT="19050" marB="19050" anchor="b">
-                    <a:lnB w="12700" cap="flat" cmpd="sng" algn="ctr">
-                      <a:solidFill>
-                        <a:schemeClr val="tx1"/>
-                      </a:solidFill>
-                      <a:prstDash val="solid"/>
-                      <a:round/>
-                      <a:headEnd type="none" w="med" len="med"/>
-                      <a:tailEnd type="none" w="med" len="med"/>
-                    </a:lnB>
-                  </a:tcPr>
-                </a:tc>
-                <a:tc>
-                  <a:txBody>
-                    <a:bodyPr/>
-                    <a:lstStyle/>
-                    <a:p>
-                      <a:pPr algn="r" rtl="0" fontAlgn="b"/>
-                      <a:r>
-                        <a:rPr lang="en-US" dirty="0">
-                          <a:effectLst/>
-                        </a:rPr>
-                        <a:t>$2,000</a:t>
-                      </a:r>
-                    </a:p>
-                  </a:txBody>
-                  <a:tcPr marL="28575" marR="28575" marT="19050" marB="19050" anchor="b">
-                    <a:lnB w="12700" cap="flat" cmpd="sng" algn="ctr">
-                      <a:solidFill>
-                        <a:schemeClr val="tx1"/>
-                      </a:solidFill>
-                      <a:prstDash val="solid"/>
-                      <a:round/>
-                      <a:headEnd type="none" w="med" len="med"/>
-                      <a:tailEnd type="none" w="med" len="med"/>
-                    </a:lnB>
-                  </a:tcPr>
-                </a:tc>
-                <a:tc>
-                  <a:txBody>
-                    <a:bodyPr/>
-                    <a:lstStyle/>
-                    <a:p>
-                      <a:pPr algn="r" rtl="0" fontAlgn="b"/>
-                      <a:r>
-                        <a:rPr lang="en-US" dirty="0">
-                          <a:effectLst/>
-                        </a:rPr>
-                        <a:t>$2,000</a:t>
-                      </a:r>
-                    </a:p>
-                  </a:txBody>
-                  <a:tcPr marL="28575" marR="28575" marT="19050" marB="19050" anchor="b">
-                    <a:lnB w="12700" cap="flat" cmpd="sng" algn="ctr">
-                      <a:solidFill>
-                        <a:schemeClr val="tx1"/>
-                      </a:solidFill>
-                      <a:prstDash val="solid"/>
-                      <a:round/>
-                      <a:headEnd type="none" w="med" len="med"/>
-                      <a:tailEnd type="none" w="med" len="med"/>
-                    </a:lnB>
-                  </a:tcPr>
-                </a:tc>
-                <a:tc>
-                  <a:txBody>
-                    <a:bodyPr/>
-                    <a:lstStyle/>
-                    <a:p>
-                      <a:pPr algn="r" rtl="0" fontAlgn="b"/>
-                      <a:r>
-                        <a:rPr lang="en-US" dirty="0">
-                          <a:effectLst/>
-                        </a:rPr>
-                        <a:t>$2,000</a:t>
-                      </a:r>
-                    </a:p>
-                  </a:txBody>
-                  <a:tcPr marL="28575" marR="28575" marT="19050" marB="19050" anchor="b">
-                    <a:lnR w="12700" cap="flat" cmpd="sng" algn="ctr">
-                      <a:solidFill>
-                        <a:schemeClr val="tx1"/>
-                      </a:solidFill>
-                      <a:prstDash val="solid"/>
-                      <a:round/>
-                      <a:headEnd type="none" w="med" len="med"/>
-                      <a:tailEnd type="none" w="med" len="med"/>
-                    </a:lnR>
-                    <a:lnB w="12700" cap="flat" cmpd="sng" algn="ctr">
-                      <a:solidFill>
-                        <a:schemeClr val="tx1"/>
-                      </a:solidFill>
-                      <a:prstDash val="solid"/>
-                      <a:round/>
-                      <a:headEnd type="none" w="med" len="med"/>
-                      <a:tailEnd type="none" w="med" len="med"/>
-                    </a:lnB>
-                  </a:tcPr>
-                </a:tc>
-                <a:extLst>
-                  <a:ext uri="{0D108BD9-81ED-4DB2-BD59-A6C34878D82A}">
-                    <a16:rowId xmlns:a16="http://schemas.microsoft.com/office/drawing/2014/main" val="744082753"/>
-                  </a:ext>
-                </a:extLst>
-              </a:tr>
-              <a:tr h="370840">
-                <a:tc>
-                  <a:txBody>
-                    <a:bodyPr/>
-                    <a:lstStyle/>
-                    <a:p>
-                      <a:pPr rtl="0" fontAlgn="b"/>
-                      <a:endParaRPr lang="en-US" dirty="0">
-                        <a:effectLst/>
-                      </a:endParaRPr>
-                    </a:p>
-                  </a:txBody>
-                  <a:tcPr marL="28575" marR="28575" marT="19050" marB="19050" anchor="b">
-                    <a:lnL w="12700" cap="flat" cmpd="sng" algn="ctr">
-                      <a:noFill/>
-                      <a:prstDash val="solid"/>
-                      <a:round/>
-                      <a:headEnd type="none" w="med" len="med"/>
-                      <a:tailEnd type="none" w="med" len="med"/>
-                    </a:lnL>
-                    <a:lnR>
-                      <a:noFill/>
-                    </a:lnR>
-                    <a:lnT w="12700" cap="flat" cmpd="sng" algn="ctr">
-                      <a:solidFill>
-                        <a:schemeClr val="tx1"/>
-                      </a:solidFill>
-                      <a:prstDash val="solid"/>
-                      <a:round/>
-                      <a:headEnd type="none" w="med" len="med"/>
-                      <a:tailEnd type="none" w="med" len="med"/>
-                    </a:lnT>
-                    <a:lnB w="12700" cap="flat" cmpd="sng" algn="ctr">
-                      <a:solidFill>
-                        <a:schemeClr val="tx1"/>
-                      </a:solidFill>
-                      <a:prstDash val="solid"/>
-                      <a:round/>
-                      <a:headEnd type="none" w="med" len="med"/>
-                      <a:tailEnd type="none" w="med" len="med"/>
-                    </a:lnB>
-                    <a:lnTlToBr w="12700" cmpd="sng">
-                      <a:noFill/>
-                      <a:prstDash val="solid"/>
-                    </a:lnTlToBr>
-                    <a:lnBlToTr w="12700" cmpd="sng">
-                      <a:noFill/>
-                      <a:prstDash val="solid"/>
-                    </a:lnBlToTr>
-                    <a:noFill/>
-                  </a:tcPr>
-                </a:tc>
-                <a:tc>
-                  <a:txBody>
-                    <a:bodyPr/>
-                    <a:lstStyle/>
-                    <a:p>
-                      <a:pPr rtl="0" fontAlgn="b"/>
-                      <a:endParaRPr lang="en-US" dirty="0">
-                        <a:effectLst/>
-                      </a:endParaRPr>
-                    </a:p>
-                  </a:txBody>
-                  <a:tcPr marL="28575" marR="28575" marT="19050" marB="19050" anchor="b">
-                    <a:lnL>
-                      <a:noFill/>
-                    </a:lnL>
-                    <a:lnR>
-                      <a:noFill/>
-                    </a:lnR>
-                    <a:lnT w="12700" cap="flat" cmpd="sng" algn="ctr">
-                      <a:solidFill>
-                        <a:schemeClr val="tx1"/>
-                      </a:solidFill>
-                      <a:prstDash val="solid"/>
-                      <a:round/>
-                      <a:headEnd type="none" w="med" len="med"/>
-                      <a:tailEnd type="none" w="med" len="med"/>
-                    </a:lnT>
-                    <a:lnB w="12700" cap="flat" cmpd="sng" algn="ctr">
-                      <a:solidFill>
-                        <a:schemeClr val="tx1"/>
-                      </a:solidFill>
-                      <a:prstDash val="solid"/>
-                      <a:round/>
-                      <a:headEnd type="none" w="med" len="med"/>
-                      <a:tailEnd type="none" w="med" len="med"/>
-                    </a:lnB>
-                    <a:lnTlToBr w="12700" cmpd="sng">
-                      <a:noFill/>
-                      <a:prstDash val="solid"/>
-                    </a:lnTlToBr>
-                    <a:lnBlToTr w="12700" cmpd="sng">
-                      <a:noFill/>
-                      <a:prstDash val="solid"/>
-                    </a:lnBlToTr>
-                    <a:noFill/>
-                  </a:tcPr>
-                </a:tc>
-                <a:tc>
-                  <a:txBody>
-                    <a:bodyPr/>
-                    <a:lstStyle/>
-                    <a:p>
-                      <a:pPr algn="r" rtl="0" fontAlgn="b"/>
-                      <a:endParaRPr lang="en-US" dirty="0">
-                        <a:effectLst/>
-                      </a:endParaRPr>
-                    </a:p>
-                  </a:txBody>
-                  <a:tcPr marL="28575" marR="28575" marT="19050" marB="19050" anchor="b">
-                    <a:lnL>
-                      <a:noFill/>
-                    </a:lnL>
-                    <a:lnR>
-                      <a:noFill/>
-                    </a:lnR>
-                    <a:lnT w="12700" cap="flat" cmpd="sng" algn="ctr">
-                      <a:solidFill>
-                        <a:schemeClr val="tx1"/>
-                      </a:solidFill>
-                      <a:prstDash val="solid"/>
-                      <a:round/>
-                      <a:headEnd type="none" w="med" len="med"/>
-                      <a:tailEnd type="none" w="med" len="med"/>
-                    </a:lnT>
-                    <a:lnB w="12700" cap="flat" cmpd="sng" algn="ctr">
-                      <a:solidFill>
-                        <a:schemeClr val="tx1"/>
-                      </a:solidFill>
-                      <a:prstDash val="solid"/>
-                      <a:round/>
-                      <a:headEnd type="none" w="med" len="med"/>
-                      <a:tailEnd type="none" w="med" len="med"/>
-                    </a:lnB>
-                    <a:lnTlToBr w="12700" cmpd="sng">
-                      <a:noFill/>
-                      <a:prstDash val="solid"/>
-                    </a:lnTlToBr>
-                    <a:lnBlToTr w="12700" cmpd="sng">
-                      <a:noFill/>
-                      <a:prstDash val="solid"/>
-                    </a:lnBlToTr>
-                    <a:noFill/>
-                  </a:tcPr>
-                </a:tc>
-                <a:tc>
-                  <a:txBody>
-                    <a:bodyPr/>
-                    <a:lstStyle/>
-                    <a:p>
-                      <a:pPr algn="r" rtl="0" fontAlgn="b"/>
-                      <a:endParaRPr lang="en-US" dirty="0">
-                        <a:effectLst/>
-                      </a:endParaRPr>
-                    </a:p>
-                  </a:txBody>
-                  <a:tcPr marL="28575" marR="28575" marT="19050" marB="19050" anchor="b">
-                    <a:lnL>
-                      <a:noFill/>
-                    </a:lnL>
-                    <a:lnR>
-                      <a:noFill/>
-                    </a:lnR>
-                    <a:lnT w="12700" cap="flat" cmpd="sng" algn="ctr">
-                      <a:solidFill>
-                        <a:schemeClr val="tx1"/>
-                      </a:solidFill>
-                      <a:prstDash val="solid"/>
-                      <a:round/>
-                      <a:headEnd type="none" w="med" len="med"/>
-                      <a:tailEnd type="none" w="med" len="med"/>
-                    </a:lnT>
-                    <a:lnB w="12700" cap="flat" cmpd="sng" algn="ctr">
-                      <a:solidFill>
-                        <a:schemeClr val="tx1"/>
-                      </a:solidFill>
-                      <a:prstDash val="solid"/>
-                      <a:round/>
-                      <a:headEnd type="none" w="med" len="med"/>
-                      <a:tailEnd type="none" w="med" len="med"/>
-                    </a:lnB>
-                    <a:lnTlToBr w="12700" cmpd="sng">
-                      <a:noFill/>
-                      <a:prstDash val="solid"/>
-                    </a:lnTlToBr>
-                    <a:lnBlToTr w="12700" cmpd="sng">
-                      <a:noFill/>
-                      <a:prstDash val="solid"/>
-                    </a:lnBlToTr>
-                    <a:noFill/>
-                  </a:tcPr>
-                </a:tc>
-                <a:tc>
-                  <a:txBody>
-                    <a:bodyPr/>
-                    <a:lstStyle/>
-                    <a:p>
-                      <a:pPr algn="r" rtl="0" fontAlgn="b"/>
-                      <a:endParaRPr lang="en-US" dirty="0">
-                        <a:effectLst/>
-                      </a:endParaRPr>
-                    </a:p>
-                  </a:txBody>
-                  <a:tcPr marL="28575" marR="28575" marT="19050" marB="19050" anchor="b">
-                    <a:lnL>
-                      <a:noFill/>
-                    </a:lnL>
-                    <a:lnR w="12700" cap="flat" cmpd="sng" algn="ctr">
-                      <a:noFill/>
-                      <a:prstDash val="solid"/>
-                      <a:round/>
-                      <a:headEnd type="none" w="med" len="med"/>
-                      <a:tailEnd type="none" w="med" len="med"/>
-                    </a:lnR>
-                    <a:lnT w="12700" cap="flat" cmpd="sng" algn="ctr">
-                      <a:solidFill>
-                        <a:schemeClr val="tx1"/>
-                      </a:solidFill>
-                      <a:prstDash val="solid"/>
-                      <a:round/>
-                      <a:headEnd type="none" w="med" len="med"/>
-                      <a:tailEnd type="none" w="med" len="med"/>
-                    </a:lnT>
-                    <a:lnB w="12700" cap="flat" cmpd="sng" algn="ctr">
-                      <a:solidFill>
-                        <a:schemeClr val="tx1"/>
-                      </a:solidFill>
-                      <a:prstDash val="solid"/>
-                      <a:round/>
-                      <a:headEnd type="none" w="med" len="med"/>
-                      <a:tailEnd type="none" w="med" len="med"/>
-                    </a:lnB>
-                    <a:lnTlToBr w="12700" cmpd="sng">
-                      <a:noFill/>
-                      <a:prstDash val="solid"/>
-                    </a:lnTlToBr>
-                    <a:lnBlToTr w="12700" cmpd="sng">
-                      <a:noFill/>
-                      <a:prstDash val="solid"/>
-                    </a:lnBlToTr>
-                    <a:noFill/>
-                  </a:tcPr>
-                </a:tc>
-                <a:extLst>
-                  <a:ext uri="{0D108BD9-81ED-4DB2-BD59-A6C34878D82A}">
-                    <a16:rowId xmlns:a16="http://schemas.microsoft.com/office/drawing/2014/main" val="2721063106"/>
-                  </a:ext>
-                </a:extLst>
-              </a:tr>
-              <a:tr h="370840">
-                <a:tc>
-                  <a:txBody>
-                    <a:bodyPr/>
-                    <a:lstStyle/>
-                    <a:p>
-                      <a:pPr rtl="0" fontAlgn="b"/>
-                      <a:r>
-                        <a:rPr lang="en-US" b="1" dirty="0">
-                          <a:effectLst/>
-                        </a:rPr>
-                        <a:t>Internal Cost</a:t>
-                      </a:r>
-                    </a:p>
-                  </a:txBody>
-                  <a:tcPr marL="28575" marR="28575" marT="19050" marB="19050" anchor="b">
-                    <a:lnL w="12700" cap="flat" cmpd="sng" algn="ctr">
-                      <a:solidFill>
-                        <a:schemeClr val="tx1"/>
-                      </a:solidFill>
-                      <a:prstDash val="solid"/>
-                      <a:round/>
-                      <a:headEnd type="none" w="med" len="med"/>
-                      <a:tailEnd type="none" w="med" len="med"/>
-                    </a:lnL>
-                    <a:lnT w="12700" cap="flat" cmpd="sng" algn="ctr">
-                      <a:solidFill>
-                        <a:schemeClr val="tx1"/>
-                      </a:solidFill>
-                      <a:prstDash val="solid"/>
-                      <a:round/>
-                      <a:headEnd type="none" w="med" len="med"/>
-                      <a:tailEnd type="none" w="med" len="med"/>
-                    </a:lnT>
-                    <a:lnB w="12700" cap="flat" cmpd="sng" algn="ctr">
-                      <a:solidFill>
-                        <a:schemeClr val="tx1"/>
-                      </a:solidFill>
-                      <a:prstDash val="solid"/>
-                      <a:round/>
-                      <a:headEnd type="none" w="med" len="med"/>
-                      <a:tailEnd type="none" w="med" len="med"/>
-                    </a:lnB>
-                    <a:solidFill>
-                      <a:schemeClr val="bg1">
-                        <a:alpha val="20000"/>
-                      </a:schemeClr>
-                    </a:solidFill>
-                  </a:tcPr>
-                </a:tc>
-                <a:tc>
-                  <a:txBody>
-                    <a:bodyPr/>
-                    <a:lstStyle/>
-                    <a:p>
-                      <a:pPr rtl="0" fontAlgn="b"/>
-                      <a:endParaRPr lang="en-US" dirty="0">
-                        <a:effectLst/>
-                      </a:endParaRPr>
-                    </a:p>
-                  </a:txBody>
-                  <a:tcPr marL="28575" marR="28575" marT="19050" marB="19050" anchor="b">
-                    <a:lnT w="12700" cap="flat" cmpd="sng" algn="ctr">
-                      <a:solidFill>
-                        <a:schemeClr val="tx1"/>
-                      </a:solidFill>
-                      <a:prstDash val="solid"/>
-                      <a:round/>
-                      <a:headEnd type="none" w="med" len="med"/>
-                      <a:tailEnd type="none" w="med" len="med"/>
-                    </a:lnT>
-                    <a:lnB w="12700" cap="flat" cmpd="sng" algn="ctr">
-                      <a:solidFill>
-                        <a:schemeClr val="tx1"/>
-                      </a:solidFill>
-                      <a:prstDash val="solid"/>
-                      <a:round/>
-                      <a:headEnd type="none" w="med" len="med"/>
-                      <a:tailEnd type="none" w="med" len="med"/>
-                    </a:lnB>
-                    <a:solidFill>
-                      <a:schemeClr val="bg1">
-                        <a:alpha val="20000"/>
-                      </a:schemeClr>
-                    </a:solidFill>
-                  </a:tcPr>
-                </a:tc>
-                <a:tc>
-                  <a:txBody>
-                    <a:bodyPr/>
-                    <a:lstStyle/>
-                    <a:p>
-                      <a:pPr rtl="0" fontAlgn="b"/>
-                      <a:endParaRPr lang="en-US" dirty="0">
-                        <a:effectLst/>
-                      </a:endParaRPr>
-                    </a:p>
-                  </a:txBody>
-                  <a:tcPr marL="28575" marR="28575" marT="19050" marB="19050" anchor="b">
-                    <a:lnT w="12700" cap="flat" cmpd="sng" algn="ctr">
-                      <a:solidFill>
-                        <a:schemeClr val="tx1"/>
-                      </a:solidFill>
-                      <a:prstDash val="solid"/>
-                      <a:round/>
-                      <a:headEnd type="none" w="med" len="med"/>
-                      <a:tailEnd type="none" w="med" len="med"/>
-                    </a:lnT>
-                    <a:lnB w="12700" cap="flat" cmpd="sng" algn="ctr">
-                      <a:solidFill>
-                        <a:schemeClr val="tx1"/>
-                      </a:solidFill>
-                      <a:prstDash val="solid"/>
-                      <a:round/>
-                      <a:headEnd type="none" w="med" len="med"/>
-                      <a:tailEnd type="none" w="med" len="med"/>
-                    </a:lnB>
-                    <a:solidFill>
-                      <a:schemeClr val="bg1">
-                        <a:alpha val="20000"/>
-                      </a:schemeClr>
-                    </a:solidFill>
-                  </a:tcPr>
-                </a:tc>
-                <a:tc>
-                  <a:txBody>
-                    <a:bodyPr/>
-                    <a:lstStyle/>
-                    <a:p>
-                      <a:pPr rtl="0" fontAlgn="b"/>
-                      <a:endParaRPr lang="en-US" dirty="0">
-                        <a:effectLst/>
-                      </a:endParaRPr>
-                    </a:p>
-                  </a:txBody>
-                  <a:tcPr marL="28575" marR="28575" marT="19050" marB="19050" anchor="b">
-                    <a:lnT w="12700" cap="flat" cmpd="sng" algn="ctr">
-                      <a:solidFill>
-                        <a:schemeClr val="tx1"/>
-                      </a:solidFill>
-                      <a:prstDash val="solid"/>
-                      <a:round/>
-                      <a:headEnd type="none" w="med" len="med"/>
-                      <a:tailEnd type="none" w="med" len="med"/>
-                    </a:lnT>
-                    <a:lnB w="12700" cap="flat" cmpd="sng" algn="ctr">
-                      <a:solidFill>
-                        <a:schemeClr val="tx1"/>
-                      </a:solidFill>
-                      <a:prstDash val="solid"/>
-                      <a:round/>
-                      <a:headEnd type="none" w="med" len="med"/>
-                      <a:tailEnd type="none" w="med" len="med"/>
-                    </a:lnB>
-                    <a:solidFill>
-                      <a:schemeClr val="bg1">
-                        <a:alpha val="20000"/>
-                      </a:schemeClr>
-                    </a:solidFill>
-                  </a:tcPr>
-                </a:tc>
-                <a:tc>
-                  <a:txBody>
-                    <a:bodyPr/>
-                    <a:lstStyle/>
-                    <a:p>
-                      <a:pPr rtl="0" fontAlgn="b"/>
-                      <a:endParaRPr lang="en-US" dirty="0">
-                        <a:effectLst/>
-                      </a:endParaRPr>
-                    </a:p>
-                  </a:txBody>
-                  <a:tcPr marL="28575" marR="28575" marT="19050" marB="19050" anchor="b">
-                    <a:lnR w="12700" cap="flat" cmpd="sng" algn="ctr">
-                      <a:solidFill>
-                        <a:schemeClr val="tx1"/>
-                      </a:solidFill>
-                      <a:prstDash val="solid"/>
-                      <a:round/>
-                      <a:headEnd type="none" w="med" len="med"/>
-                      <a:tailEnd type="none" w="med" len="med"/>
-                    </a:lnR>
-                    <a:lnT w="12700" cap="flat" cmpd="sng" algn="ctr">
-                      <a:solidFill>
-                        <a:schemeClr val="tx1"/>
-                      </a:solidFill>
-                      <a:prstDash val="solid"/>
-                      <a:round/>
-                      <a:headEnd type="none" w="med" len="med"/>
-                      <a:tailEnd type="none" w="med" len="med"/>
-                    </a:lnT>
-                    <a:lnB w="12700" cap="flat" cmpd="sng" algn="ctr">
-                      <a:solidFill>
-                        <a:schemeClr val="tx1"/>
-                      </a:solidFill>
-                      <a:prstDash val="solid"/>
-                      <a:round/>
-                      <a:headEnd type="none" w="med" len="med"/>
-                      <a:tailEnd type="none" w="med" len="med"/>
-                    </a:lnB>
-                    <a:solidFill>
-                      <a:schemeClr val="bg1">
-                        <a:alpha val="20000"/>
-                      </a:schemeClr>
-                    </a:solidFill>
-                  </a:tcPr>
-                </a:tc>
-                <a:extLst>
-                  <a:ext uri="{0D108BD9-81ED-4DB2-BD59-A6C34878D82A}">
-                    <a16:rowId xmlns:a16="http://schemas.microsoft.com/office/drawing/2014/main" val="3411564193"/>
-                  </a:ext>
-                </a:extLst>
-              </a:tr>
-              <a:tr h="370840">
-                <a:tc>
-                  <a:txBody>
-                    <a:bodyPr/>
-                    <a:lstStyle/>
-                    <a:p>
-                      <a:pPr rtl="0" fontAlgn="b"/>
-                      <a:r>
-                        <a:rPr lang="en-US" dirty="0">
-                          <a:effectLst/>
-                        </a:rPr>
-                        <a:t>Training</a:t>
-                      </a:r>
-                    </a:p>
-                  </a:txBody>
-                  <a:tcPr marL="28575" marR="28575" marT="19050" marB="19050" anchor="b">
-                    <a:lnL w="12700" cap="flat" cmpd="sng" algn="ctr">
-                      <a:solidFill>
-                        <a:schemeClr val="tx1"/>
-                      </a:solidFill>
-                      <a:prstDash val="solid"/>
-                      <a:round/>
-                      <a:headEnd type="none" w="med" len="med"/>
-                      <a:tailEnd type="none" w="med" len="med"/>
-                    </a:lnL>
-                    <a:lnT w="12700" cap="flat" cmpd="sng" algn="ctr">
-                      <a:solidFill>
-                        <a:schemeClr val="tx1"/>
-                      </a:solidFill>
-                      <a:prstDash val="solid"/>
-                      <a:round/>
-                      <a:headEnd type="none" w="med" len="med"/>
-                      <a:tailEnd type="none" w="med" len="med"/>
-                    </a:lnT>
-                    <a:lnB w="12700" cap="flat" cmpd="sng" algn="ctr">
-                      <a:solidFill>
-                        <a:schemeClr val="tx1"/>
-                      </a:solidFill>
-                      <a:prstDash val="solid"/>
-                      <a:round/>
-                      <a:headEnd type="none" w="med" len="med"/>
-                      <a:tailEnd type="none" w="med" len="med"/>
-                    </a:lnB>
-                  </a:tcPr>
-                </a:tc>
-                <a:tc>
-                  <a:txBody>
-                    <a:bodyPr/>
-                    <a:lstStyle/>
-                    <a:p>
-                      <a:pPr rtl="0" fontAlgn="b"/>
-                      <a:r>
-                        <a:rPr lang="en-US">
-                          <a:effectLst/>
-                        </a:rPr>
-                        <a:t>Training in Solutions Above</a:t>
-                      </a:r>
-                    </a:p>
-                  </a:txBody>
-                  <a:tcPr marL="28575" marR="28575" marT="19050" marB="19050" anchor="b">
-                    <a:lnT w="12700" cap="flat" cmpd="sng" algn="ctr">
-                      <a:solidFill>
-                        <a:schemeClr val="tx1"/>
-                      </a:solidFill>
-                      <a:prstDash val="solid"/>
-                      <a:round/>
-                      <a:headEnd type="none" w="med" len="med"/>
-                      <a:tailEnd type="none" w="med" len="med"/>
-                    </a:lnT>
-                    <a:lnB w="12700" cap="flat" cmpd="sng" algn="ctr">
-                      <a:solidFill>
-                        <a:schemeClr val="tx1"/>
-                      </a:solidFill>
-                      <a:prstDash val="solid"/>
-                      <a:round/>
-                      <a:headEnd type="none" w="med" len="med"/>
-                      <a:tailEnd type="none" w="med" len="med"/>
-                    </a:lnB>
-                  </a:tcPr>
-                </a:tc>
-                <a:tc>
-                  <a:txBody>
-                    <a:bodyPr/>
-                    <a:lstStyle/>
-                    <a:p>
-                      <a:pPr algn="r" rtl="0" fontAlgn="b"/>
-                      <a:r>
-                        <a:rPr lang="en-US">
-                          <a:effectLst/>
-                        </a:rPr>
-                        <a:t>$1,000</a:t>
-                      </a:r>
-                    </a:p>
-                  </a:txBody>
-                  <a:tcPr marL="28575" marR="28575" marT="19050" marB="19050" anchor="b">
-                    <a:lnT w="12700" cap="flat" cmpd="sng" algn="ctr">
-                      <a:solidFill>
-                        <a:schemeClr val="tx1"/>
-                      </a:solidFill>
-                      <a:prstDash val="solid"/>
-                      <a:round/>
-                      <a:headEnd type="none" w="med" len="med"/>
-                      <a:tailEnd type="none" w="med" len="med"/>
-                    </a:lnT>
-                    <a:lnB w="12700" cap="flat" cmpd="sng" algn="ctr">
-                      <a:solidFill>
-                        <a:schemeClr val="tx1"/>
-                      </a:solidFill>
-                      <a:prstDash val="solid"/>
-                      <a:round/>
-                      <a:headEnd type="none" w="med" len="med"/>
-                      <a:tailEnd type="none" w="med" len="med"/>
-                    </a:lnB>
-                  </a:tcPr>
-                </a:tc>
-                <a:tc>
-                  <a:txBody>
-                    <a:bodyPr/>
-                    <a:lstStyle/>
-                    <a:p>
-                      <a:pPr algn="r" rtl="0" fontAlgn="b"/>
-                      <a:r>
-                        <a:rPr lang="en-US">
-                          <a:effectLst/>
-                        </a:rPr>
-                        <a:t>$0</a:t>
-                      </a:r>
-                    </a:p>
-                  </a:txBody>
-                  <a:tcPr marL="28575" marR="28575" marT="19050" marB="19050" anchor="b">
-                    <a:lnT w="12700" cap="flat" cmpd="sng" algn="ctr">
-                      <a:solidFill>
-                        <a:schemeClr val="tx1"/>
-                      </a:solidFill>
-                      <a:prstDash val="solid"/>
-                      <a:round/>
-                      <a:headEnd type="none" w="med" len="med"/>
-                      <a:tailEnd type="none" w="med" len="med"/>
-                    </a:lnT>
-                    <a:lnB w="12700" cap="flat" cmpd="sng" algn="ctr">
-                      <a:solidFill>
-                        <a:schemeClr val="tx1"/>
-                      </a:solidFill>
-                      <a:prstDash val="solid"/>
-                      <a:round/>
-                      <a:headEnd type="none" w="med" len="med"/>
-                      <a:tailEnd type="none" w="med" len="med"/>
-                    </a:lnB>
-                  </a:tcPr>
-                </a:tc>
-                <a:tc>
-                  <a:txBody>
-                    <a:bodyPr/>
-                    <a:lstStyle/>
-                    <a:p>
-                      <a:pPr algn="r" rtl="0" fontAlgn="b"/>
-                      <a:r>
-                        <a:rPr lang="en-US" dirty="0">
-                          <a:effectLst/>
-                        </a:rPr>
-                        <a:t>$0</a:t>
-                      </a:r>
-                    </a:p>
-                  </a:txBody>
-                  <a:tcPr marL="28575" marR="28575" marT="19050" marB="19050" anchor="b">
-                    <a:lnR w="12700" cap="flat" cmpd="sng" algn="ctr">
-                      <a:solidFill>
-                        <a:schemeClr val="tx1"/>
-                      </a:solidFill>
-                      <a:prstDash val="solid"/>
-                      <a:round/>
-                      <a:headEnd type="none" w="med" len="med"/>
-                      <a:tailEnd type="none" w="med" len="med"/>
-                    </a:lnR>
-                    <a:lnT w="12700" cap="flat" cmpd="sng" algn="ctr">
-                      <a:solidFill>
-                        <a:schemeClr val="tx1"/>
-                      </a:solidFill>
-                      <a:prstDash val="solid"/>
-                      <a:round/>
-                      <a:headEnd type="none" w="med" len="med"/>
-                      <a:tailEnd type="none" w="med" len="med"/>
-                    </a:lnT>
-                    <a:lnB w="12700" cap="flat" cmpd="sng" algn="ctr">
-                      <a:solidFill>
-                        <a:schemeClr val="tx1"/>
-                      </a:solidFill>
-                      <a:prstDash val="solid"/>
-                      <a:round/>
-                      <a:headEnd type="none" w="med" len="med"/>
-                      <a:tailEnd type="none" w="med" len="med"/>
-                    </a:lnB>
-                  </a:tcPr>
-                </a:tc>
-                <a:extLst>
-                  <a:ext uri="{0D108BD9-81ED-4DB2-BD59-A6C34878D82A}">
-                    <a16:rowId xmlns:a16="http://schemas.microsoft.com/office/drawing/2014/main" val="304209025"/>
-                  </a:ext>
-                </a:extLst>
-              </a:tr>
-              <a:tr h="370840">
-                <a:tc>
-                  <a:txBody>
-                    <a:bodyPr/>
-                    <a:lstStyle/>
-                    <a:p>
-                      <a:pPr rtl="0" fontAlgn="b"/>
-                      <a:endParaRPr lang="en-US" dirty="0">
-                        <a:effectLst/>
-                      </a:endParaRPr>
-                    </a:p>
-                  </a:txBody>
-                  <a:tcPr marL="28575" marR="28575" marT="19050" marB="19050" anchor="b">
-                    <a:lnL w="12700" cap="flat" cmpd="sng" algn="ctr">
-                      <a:noFill/>
-                      <a:prstDash val="solid"/>
-                      <a:round/>
-                      <a:headEnd type="none" w="med" len="med"/>
-                      <a:tailEnd type="none" w="med" len="med"/>
-                    </a:lnL>
-                    <a:lnR>
-                      <a:noFill/>
-                    </a:lnR>
-                    <a:lnT w="12700" cap="flat" cmpd="sng" algn="ctr">
-                      <a:solidFill>
-                        <a:schemeClr val="tx1"/>
-                      </a:solidFill>
-                      <a:prstDash val="solid"/>
-                      <a:round/>
-                      <a:headEnd type="none" w="med" len="med"/>
-                      <a:tailEnd type="none" w="med" len="med"/>
-                    </a:lnT>
-                    <a:lnB w="12700" cap="flat" cmpd="sng" algn="ctr">
-                      <a:solidFill>
-                        <a:schemeClr val="tx1"/>
-                      </a:solidFill>
-                      <a:prstDash val="solid"/>
-                      <a:round/>
-                      <a:headEnd type="none" w="med" len="med"/>
-                      <a:tailEnd type="none" w="med" len="med"/>
-                    </a:lnB>
-                    <a:lnTlToBr w="12700" cmpd="sng">
-                      <a:noFill/>
-                      <a:prstDash val="solid"/>
-                    </a:lnTlToBr>
-                    <a:lnBlToTr w="12700" cmpd="sng">
-                      <a:noFill/>
-                      <a:prstDash val="solid"/>
-                    </a:lnBlToTr>
-                    <a:noFill/>
-                  </a:tcPr>
-                </a:tc>
-                <a:tc>
-                  <a:txBody>
-                    <a:bodyPr/>
-                    <a:lstStyle/>
-                    <a:p>
-                      <a:pPr rtl="0" fontAlgn="b"/>
-                      <a:endParaRPr lang="en-US" dirty="0">
-                        <a:effectLst/>
-                      </a:endParaRPr>
-                    </a:p>
-                  </a:txBody>
-                  <a:tcPr marL="28575" marR="28575" marT="19050" marB="19050" anchor="b">
-                    <a:lnL>
-                      <a:noFill/>
-                    </a:lnL>
-                    <a:lnR>
-                      <a:noFill/>
-                    </a:lnR>
-                    <a:lnT w="12700" cap="flat" cmpd="sng" algn="ctr">
-                      <a:solidFill>
-                        <a:schemeClr val="tx1"/>
-                      </a:solidFill>
-                      <a:prstDash val="solid"/>
-                      <a:round/>
-                      <a:headEnd type="none" w="med" len="med"/>
-                      <a:tailEnd type="none" w="med" len="med"/>
-                    </a:lnT>
-                    <a:lnB w="12700" cap="flat" cmpd="sng" algn="ctr">
-                      <a:solidFill>
-                        <a:schemeClr val="tx1"/>
-                      </a:solidFill>
-                      <a:prstDash val="solid"/>
-                      <a:round/>
-                      <a:headEnd type="none" w="med" len="med"/>
-                      <a:tailEnd type="none" w="med" len="med"/>
-                    </a:lnB>
-                    <a:lnTlToBr w="12700" cmpd="sng">
-                      <a:noFill/>
-                      <a:prstDash val="solid"/>
-                    </a:lnTlToBr>
-                    <a:lnBlToTr w="12700" cmpd="sng">
-                      <a:noFill/>
-                      <a:prstDash val="solid"/>
-                    </a:lnBlToTr>
-                    <a:noFill/>
-                  </a:tcPr>
-                </a:tc>
-                <a:tc>
-                  <a:txBody>
-                    <a:bodyPr/>
-                    <a:lstStyle/>
-                    <a:p>
-                      <a:pPr algn="r" rtl="0" fontAlgn="b"/>
-                      <a:endParaRPr lang="en-US" dirty="0">
-                        <a:effectLst/>
-                      </a:endParaRPr>
-                    </a:p>
-                  </a:txBody>
-                  <a:tcPr marL="28575" marR="28575" marT="19050" marB="19050" anchor="b">
-                    <a:lnL>
-                      <a:noFill/>
-                    </a:lnL>
-                    <a:lnR>
-                      <a:noFill/>
-                    </a:lnR>
-                    <a:lnT w="12700" cap="flat" cmpd="sng" algn="ctr">
-                      <a:solidFill>
-                        <a:schemeClr val="tx1"/>
-                      </a:solidFill>
-                      <a:prstDash val="solid"/>
-                      <a:round/>
-                      <a:headEnd type="none" w="med" len="med"/>
-                      <a:tailEnd type="none" w="med" len="med"/>
-                    </a:lnT>
-                    <a:lnB w="12700" cap="flat" cmpd="sng" algn="ctr">
-                      <a:solidFill>
-                        <a:schemeClr val="tx1"/>
-                      </a:solidFill>
-                      <a:prstDash val="solid"/>
-                      <a:round/>
-                      <a:headEnd type="none" w="med" len="med"/>
-                      <a:tailEnd type="none" w="med" len="med"/>
-                    </a:lnB>
-                    <a:lnTlToBr w="12700" cmpd="sng">
-                      <a:noFill/>
-                      <a:prstDash val="solid"/>
-                    </a:lnTlToBr>
-                    <a:lnBlToTr w="12700" cmpd="sng">
-                      <a:noFill/>
-                      <a:prstDash val="solid"/>
-                    </a:lnBlToTr>
-                    <a:noFill/>
-                  </a:tcPr>
-                </a:tc>
-                <a:tc>
-                  <a:txBody>
-                    <a:bodyPr/>
-                    <a:lstStyle/>
-                    <a:p>
-                      <a:pPr algn="r" rtl="0" fontAlgn="b"/>
-                      <a:endParaRPr lang="en-US" dirty="0">
-                        <a:effectLst/>
-                      </a:endParaRPr>
-                    </a:p>
-                  </a:txBody>
-                  <a:tcPr marL="28575" marR="28575" marT="19050" marB="19050" anchor="b">
-                    <a:lnL>
-                      <a:noFill/>
-                    </a:lnL>
-                    <a:lnR>
-                      <a:noFill/>
-                    </a:lnR>
-                    <a:lnT w="12700" cap="flat" cmpd="sng" algn="ctr">
-                      <a:solidFill>
-                        <a:schemeClr val="tx1"/>
-                      </a:solidFill>
-                      <a:prstDash val="solid"/>
-                      <a:round/>
-                      <a:headEnd type="none" w="med" len="med"/>
-                      <a:tailEnd type="none" w="med" len="med"/>
-                    </a:lnT>
-                    <a:lnB w="12700" cap="flat" cmpd="sng" algn="ctr">
-                      <a:solidFill>
-                        <a:schemeClr val="tx1"/>
-                      </a:solidFill>
-                      <a:prstDash val="solid"/>
-                      <a:round/>
-                      <a:headEnd type="none" w="med" len="med"/>
-                      <a:tailEnd type="none" w="med" len="med"/>
-                    </a:lnB>
-                    <a:lnTlToBr w="12700" cmpd="sng">
-                      <a:noFill/>
-                      <a:prstDash val="solid"/>
-                    </a:lnTlToBr>
-                    <a:lnBlToTr w="12700" cmpd="sng">
-                      <a:noFill/>
-                      <a:prstDash val="solid"/>
-                    </a:lnBlToTr>
-                    <a:noFill/>
-                  </a:tcPr>
-                </a:tc>
-                <a:tc>
-                  <a:txBody>
-                    <a:bodyPr/>
-                    <a:lstStyle/>
-                    <a:p>
-                      <a:pPr algn="r" rtl="0" fontAlgn="b"/>
-                      <a:endParaRPr lang="en-US" dirty="0">
-                        <a:effectLst/>
-                      </a:endParaRPr>
-                    </a:p>
-                  </a:txBody>
-                  <a:tcPr marL="28575" marR="28575" marT="19050" marB="19050" anchor="b">
-                    <a:lnL>
-                      <a:noFill/>
-                    </a:lnL>
-                    <a:lnR w="12700" cap="flat" cmpd="sng" algn="ctr">
-                      <a:noFill/>
-                      <a:prstDash val="solid"/>
-                      <a:round/>
-                      <a:headEnd type="none" w="med" len="med"/>
-                      <a:tailEnd type="none" w="med" len="med"/>
-                    </a:lnR>
-                    <a:lnT w="12700" cap="flat" cmpd="sng" algn="ctr">
-                      <a:solidFill>
-                        <a:schemeClr val="tx1"/>
-                      </a:solidFill>
-                      <a:prstDash val="solid"/>
-                      <a:round/>
-                      <a:headEnd type="none" w="med" len="med"/>
-                      <a:tailEnd type="none" w="med" len="med"/>
-                    </a:lnT>
-                    <a:lnB w="12700" cap="flat" cmpd="sng" algn="ctr">
-                      <a:solidFill>
-                        <a:schemeClr val="tx1"/>
-                      </a:solidFill>
-                      <a:prstDash val="solid"/>
-                      <a:round/>
-                      <a:headEnd type="none" w="med" len="med"/>
-                      <a:tailEnd type="none" w="med" len="med"/>
-                    </a:lnB>
-                    <a:lnTlToBr w="12700" cmpd="sng">
-                      <a:noFill/>
-                      <a:prstDash val="solid"/>
-                    </a:lnTlToBr>
-                    <a:lnBlToTr w="12700" cmpd="sng">
-                      <a:noFill/>
-                      <a:prstDash val="solid"/>
-                    </a:lnBlToTr>
-                    <a:noFill/>
-                  </a:tcPr>
-                </a:tc>
-                <a:extLst>
-                  <a:ext uri="{0D108BD9-81ED-4DB2-BD59-A6C34878D82A}">
-                    <a16:rowId xmlns:a16="http://schemas.microsoft.com/office/drawing/2014/main" val="766628623"/>
-                  </a:ext>
-                </a:extLst>
-              </a:tr>
-              <a:tr h="370840">
-                <a:tc>
-                  <a:txBody>
-                    <a:bodyPr/>
-                    <a:lstStyle/>
-                    <a:p>
-                      <a:pPr rtl="0" fontAlgn="b"/>
-                      <a:r>
-                        <a:rPr lang="en-US" b="1" dirty="0">
-                          <a:effectLst/>
-                        </a:rPr>
-                        <a:t>Total</a:t>
-                      </a:r>
-                    </a:p>
-                  </a:txBody>
-                  <a:tcPr marL="28575" marR="28575" marT="19050" marB="19050" anchor="b">
-                    <a:lnL w="12700" cap="flat" cmpd="sng" algn="ctr">
-                      <a:solidFill>
-                        <a:schemeClr val="tx1"/>
-                      </a:solidFill>
-                      <a:prstDash val="solid"/>
-                      <a:round/>
-                      <a:headEnd type="none" w="med" len="med"/>
-                      <a:tailEnd type="none" w="med" len="med"/>
-                    </a:lnL>
-                    <a:lnT w="12700" cap="flat" cmpd="sng" algn="ctr">
-                      <a:solidFill>
-                        <a:schemeClr val="tx1"/>
-                      </a:solidFill>
-                      <a:prstDash val="solid"/>
-                      <a:round/>
-                      <a:headEnd type="none" w="med" len="med"/>
-                      <a:tailEnd type="none" w="med" len="med"/>
-                    </a:lnT>
-                    <a:solidFill>
-                      <a:schemeClr val="bg1">
-                        <a:alpha val="20000"/>
-                      </a:schemeClr>
-                    </a:solidFill>
-                  </a:tcPr>
-                </a:tc>
-                <a:tc>
-                  <a:txBody>
-                    <a:bodyPr/>
-                    <a:lstStyle/>
-                    <a:p>
-                      <a:pPr rtl="0" fontAlgn="b"/>
-                      <a:endParaRPr lang="en-US" dirty="0">
-                        <a:effectLst/>
-                      </a:endParaRPr>
-                    </a:p>
-                  </a:txBody>
-                  <a:tcPr marL="28575" marR="28575" marT="19050" marB="19050" anchor="b">
-                    <a:lnT w="12700" cap="flat" cmpd="sng" algn="ctr">
-                      <a:solidFill>
-                        <a:schemeClr val="tx1"/>
-                      </a:solidFill>
-                      <a:prstDash val="solid"/>
-                      <a:round/>
-                      <a:headEnd type="none" w="med" len="med"/>
-                      <a:tailEnd type="none" w="med" len="med"/>
-                    </a:lnT>
-                    <a:solidFill>
-                      <a:schemeClr val="bg1">
-                        <a:alpha val="20000"/>
-                      </a:schemeClr>
-                    </a:solidFill>
-                  </a:tcPr>
-                </a:tc>
-                <a:tc>
-                  <a:txBody>
-                    <a:bodyPr/>
-                    <a:lstStyle/>
-                    <a:p>
-                      <a:pPr algn="r" rtl="0" fontAlgn="b"/>
-                      <a:r>
-                        <a:rPr lang="en-US" dirty="0">
-                          <a:effectLst/>
-                        </a:rPr>
-                        <a:t>$7,944</a:t>
-                      </a:r>
-                    </a:p>
-                  </a:txBody>
-                  <a:tcPr marL="28575" marR="28575" marT="19050" marB="19050" anchor="b">
-                    <a:lnT w="12700" cap="flat" cmpd="sng" algn="ctr">
-                      <a:solidFill>
-                        <a:schemeClr val="tx1"/>
-                      </a:solidFill>
-                      <a:prstDash val="solid"/>
-                      <a:round/>
-                      <a:headEnd type="none" w="med" len="med"/>
-                      <a:tailEnd type="none" w="med" len="med"/>
-                    </a:lnT>
-                    <a:solidFill>
-                      <a:schemeClr val="bg1">
-                        <a:alpha val="20000"/>
-                      </a:schemeClr>
-                    </a:solidFill>
-                  </a:tcPr>
-                </a:tc>
-                <a:tc>
-                  <a:txBody>
-                    <a:bodyPr/>
-                    <a:lstStyle/>
-                    <a:p>
-                      <a:pPr algn="r" rtl="0" fontAlgn="b"/>
-                      <a:r>
-                        <a:rPr lang="en-US" dirty="0">
-                          <a:effectLst/>
-                        </a:rPr>
-                        <a:t>$5,944</a:t>
-                      </a:r>
-                    </a:p>
-                  </a:txBody>
-                  <a:tcPr marL="28575" marR="28575" marT="19050" marB="19050" anchor="b">
-                    <a:lnT w="12700" cap="flat" cmpd="sng" algn="ctr">
-                      <a:solidFill>
-                        <a:schemeClr val="tx1"/>
-                      </a:solidFill>
-                      <a:prstDash val="solid"/>
-                      <a:round/>
-                      <a:headEnd type="none" w="med" len="med"/>
-                      <a:tailEnd type="none" w="med" len="med"/>
-                    </a:lnT>
-                    <a:solidFill>
-                      <a:schemeClr val="bg1">
-                        <a:alpha val="20000"/>
-                      </a:schemeClr>
-                    </a:solidFill>
-                  </a:tcPr>
-                </a:tc>
-                <a:tc>
-                  <a:txBody>
-                    <a:bodyPr/>
-                    <a:lstStyle/>
-                    <a:p>
-                      <a:pPr algn="r" rtl="0" fontAlgn="b"/>
-                      <a:r>
-                        <a:rPr lang="en-US" dirty="0">
-                          <a:effectLst/>
-                        </a:rPr>
-                        <a:t>$5,944</a:t>
-                      </a:r>
-                    </a:p>
-                  </a:txBody>
-                  <a:tcPr marL="28575" marR="28575" marT="19050" marB="19050" anchor="b">
-                    <a:lnR w="12700" cap="flat" cmpd="sng" algn="ctr">
-                      <a:solidFill>
-                        <a:schemeClr val="tx1"/>
-                      </a:solidFill>
-                      <a:prstDash val="solid"/>
-                      <a:round/>
-                      <a:headEnd type="none" w="med" len="med"/>
-                      <a:tailEnd type="none" w="med" len="med"/>
-                    </a:lnR>
-                    <a:lnT w="12700" cap="flat" cmpd="sng" algn="ctr">
-                      <a:solidFill>
-                        <a:schemeClr val="tx1"/>
-                      </a:solidFill>
-                      <a:prstDash val="solid"/>
-                      <a:round/>
-                      <a:headEnd type="none" w="med" len="med"/>
-                      <a:tailEnd type="none" w="med" len="med"/>
-                    </a:lnT>
-                    <a:solidFill>
-                      <a:schemeClr val="bg1">
-                        <a:alpha val="20000"/>
-                      </a:schemeClr>
-                    </a:solidFill>
-                  </a:tcPr>
-                </a:tc>
-                <a:extLst>
-                  <a:ext uri="{0D108BD9-81ED-4DB2-BD59-A6C34878D82A}">
-                    <a16:rowId xmlns:a16="http://schemas.microsoft.com/office/drawing/2014/main" val="860300593"/>
-                  </a:ext>
-                </a:extLst>
-              </a:tr>
-            </a:tbl>
-          </a:graphicData>
-        </a:graphic>
-      </p:graphicFrame>
-    </p:spTree>
-    <p:extLst>
-      <p:ext uri="{BB962C8B-B14F-4D97-AF65-F5344CB8AC3E}">
-        <p14:creationId xmlns:p14="http://schemas.microsoft.com/office/powerpoint/2010/main" val="625277202"/>
-      </p:ext>
-    </p:extLst>
-  </p:cSld>
-  <p:clrMapOvr>
-    <a:masterClrMapping/>
-  </p:clrMapOvr>
-</p:sld>
-</file>
-
-<file path=ppt/slides/slide11.xml><?xml version="1.0" encoding="utf-8"?>
-<p:sld xmlns:a="http://schemas.openxmlformats.org/drawingml/2006/main" xmlns:r="http://schemas.openxmlformats.org/officeDocument/2006/relationships" xmlns:p="http://schemas.openxmlformats.org/presentationml/2006/main">
-  <p:cSld>
-    <p:spTree>
-      <p:nvGrpSpPr>
-        <p:cNvPr id="1" name=""/>
-        <p:cNvGrpSpPr/>
-        <p:nvPr/>
-      </p:nvGrpSpPr>
-      <p:grpSpPr>
-        <a:xfrm>
-          <a:off x="0" y="0"/>
-          <a:ext cx="0" cy="0"/>
-          <a:chOff x="0" y="0"/>
-          <a:chExt cx="0" cy="0"/>
-        </a:xfrm>
-      </p:grpSpPr>
-      <p:sp>
-        <p:nvSpPr>
-          <p:cNvPr id="2" name="Title 1">
-            <a:extLst>
-              <a:ext uri="{FF2B5EF4-FFF2-40B4-BE49-F238E27FC236}">
                 <a16:creationId xmlns:a16="http://schemas.microsoft.com/office/drawing/2014/main" id="{B7966A37-B155-4221-A0A7-8882DACE491F}"/>
               </a:ext>
             </a:extLst>
@@ -18178,7 +16386,7 @@
 </p:sld>
 </file>
 
-<file path=ppt/slides/slide12.xml><?xml version="1.0" encoding="utf-8"?>
+<file path=ppt/slides/slide11.xml><?xml version="1.0" encoding="utf-8"?>
 <p:sld xmlns:a="http://schemas.openxmlformats.org/drawingml/2006/main" xmlns:r="http://schemas.openxmlformats.org/officeDocument/2006/relationships" xmlns:p="http://schemas.openxmlformats.org/presentationml/2006/main">
   <p:cSld>
     <p:spTree>
@@ -18218,7 +16426,7 @@
           <a:p>
             <a:r>
               <a:rPr lang="en-US" dirty="0"/>
-              <a:t>conclusion</a:t>
+              <a:t>Conclusion</a:t>
             </a:r>
           </a:p>
         </p:txBody>
@@ -18239,12 +16447,89 @@
             <p:ph idx="1"/>
           </p:nvPr>
         </p:nvSpPr>
-        <p:spPr/>
+        <p:spPr>
+          <a:xfrm>
+            <a:off x="1484311" y="2140788"/>
+            <a:ext cx="10018713" cy="3124201"/>
+          </a:xfrm>
+        </p:spPr>
         <p:txBody>
           <a:bodyPr/>
           <a:lstStyle/>
           <a:p>
-            <a:endParaRPr lang="en-US"/>
+            <a:r>
+              <a:rPr lang="en-US" dirty="0"/>
+              <a:t>Google Workspace provides a great experience for transferring sensitive documents between businesses and clients.</a:t>
+            </a:r>
+          </a:p>
+          <a:p>
+            <a:r>
+              <a:rPr lang="en-US" dirty="0" err="1"/>
+              <a:t>BigTime</a:t>
+            </a:r>
+            <a:r>
+              <a:rPr lang="en-US" dirty="0"/>
+              <a:t> allows easy time management, billing, and notifications.</a:t>
+            </a:r>
+          </a:p>
+          <a:p>
+            <a:r>
+              <a:rPr lang="en-US" dirty="0"/>
+              <a:t>Meta Advertising allows fast and simple methods for advertising to Instagram and Facebook.</a:t>
+            </a:r>
+          </a:p>
+          <a:p>
+            <a:r>
+              <a:rPr lang="en-US" dirty="0"/>
+              <a:t>We, </a:t>
+            </a:r>
+            <a:r>
+              <a:rPr lang="en-US" dirty="0" err="1"/>
+              <a:t>Shookum</a:t>
+            </a:r>
+            <a:r>
+              <a:rPr lang="en-US" dirty="0"/>
+              <a:t>, will give our best to deliver great quality advertising.</a:t>
+            </a:r>
+          </a:p>
+          <a:p>
+            <a:endParaRPr lang="en-US" dirty="0"/>
+          </a:p>
+        </p:txBody>
+      </p:sp>
+      <p:sp>
+        <p:nvSpPr>
+          <p:cNvPr id="4" name="TextBox 3">
+            <a:extLst>
+              <a:ext uri="{FF2B5EF4-FFF2-40B4-BE49-F238E27FC236}">
+                <a16:creationId xmlns:a16="http://schemas.microsoft.com/office/drawing/2014/main" id="{05487CF6-7518-4418-A2D3-8B089D58A831}"/>
+              </a:ext>
+            </a:extLst>
+          </p:cNvPr>
+          <p:cNvSpPr txBox="1"/>
+          <p:nvPr/>
+        </p:nvSpPr>
+        <p:spPr>
+          <a:xfrm>
+            <a:off x="1484311" y="5339751"/>
+            <a:ext cx="10018713" cy="646331"/>
+          </a:xfrm>
+          <a:prstGeom prst="rect">
+            <a:avLst/>
+          </a:prstGeom>
+          <a:noFill/>
+        </p:spPr>
+        <p:txBody>
+          <a:bodyPr wrap="square" rtlCol="0">
+            <a:spAutoFit/>
+          </a:bodyPr>
+          <a:lstStyle/>
+          <a:p>
+            <a:pPr algn="ctr"/>
+            <a:r>
+              <a:rPr lang="en-US" sz="3600" dirty="0"/>
+              <a:t>We’re ready to take the next steps when you are!</a:t>
+            </a:r>
           </a:p>
         </p:txBody>
       </p:sp>
@@ -23797,7 +22082,7 @@
           <p:cNvPr id="2" name="Title 1">
             <a:extLst>
               <a:ext uri="{FF2B5EF4-FFF2-40B4-BE49-F238E27FC236}">
-                <a16:creationId xmlns:a16="http://schemas.microsoft.com/office/drawing/2014/main" id="{640EBF79-BE27-4959-B956-D6D9E03F2611}"/>
+                <a16:creationId xmlns:a16="http://schemas.microsoft.com/office/drawing/2014/main" id="{8E57C0AE-340B-4DEF-A2AB-3C6195B79004}"/>
               </a:ext>
             </a:extLst>
           </p:cNvPr>
@@ -23815,15 +22100,1748 @@
           <a:p>
             <a:r>
               <a:rPr lang="en-US" dirty="0"/>
-              <a:t>Integration</a:t>
+              <a:t>Cost</a:t>
             </a:r>
           </a:p>
         </p:txBody>
       </p:sp>
+      <p:graphicFrame>
+        <p:nvGraphicFramePr>
+          <p:cNvPr id="4" name="Table 4">
+            <a:extLst>
+              <a:ext uri="{FF2B5EF4-FFF2-40B4-BE49-F238E27FC236}">
+                <a16:creationId xmlns:a16="http://schemas.microsoft.com/office/drawing/2014/main" id="{9C6889DD-01A3-489A-9773-26A6933CCA6B}"/>
+              </a:ext>
+            </a:extLst>
+          </p:cNvPr>
+          <p:cNvGraphicFramePr>
+            <a:graphicFrameLocks noGrp="1"/>
+          </p:cNvGraphicFramePr>
+          <p:nvPr>
+            <p:ph idx="1"/>
+            <p:extLst>
+              <p:ext uri="{D42A27DB-BD31-4B8C-83A1-F6EECF244321}">
+                <p14:modId xmlns:p14="http://schemas.microsoft.com/office/powerpoint/2010/main" val="2576805687"/>
+              </p:ext>
+            </p:extLst>
+          </p:nvPr>
+        </p:nvGraphicFramePr>
+        <p:xfrm>
+          <a:off x="1484313" y="2183920"/>
+          <a:ext cx="10018708" cy="3708400"/>
+        </p:xfrm>
+        <a:graphic>
+          <a:graphicData uri="http://schemas.openxmlformats.org/drawingml/2006/table">
+            <a:tbl>
+              <a:tblPr firstRow="1" bandRow="1">
+                <a:tableStyleId>{9D7B26C5-4107-4FEC-AEDC-1716B250A1EF}</a:tableStyleId>
+              </a:tblPr>
+              <a:tblGrid>
+                <a:gridCol w="2003742">
+                  <a:extLst>
+                    <a:ext uri="{9D8B030D-6E8A-4147-A177-3AD203B41FA5}">
+                      <a16:colId xmlns:a16="http://schemas.microsoft.com/office/drawing/2014/main" val="1769105935"/>
+                    </a:ext>
+                  </a:extLst>
+                </a:gridCol>
+                <a:gridCol w="3870277">
+                  <a:extLst>
+                    <a:ext uri="{9D8B030D-6E8A-4147-A177-3AD203B41FA5}">
+                      <a16:colId xmlns:a16="http://schemas.microsoft.com/office/drawing/2014/main" val="2208315416"/>
+                    </a:ext>
+                  </a:extLst>
+                </a:gridCol>
+                <a:gridCol w="1381563">
+                  <a:extLst>
+                    <a:ext uri="{9D8B030D-6E8A-4147-A177-3AD203B41FA5}">
+                      <a16:colId xmlns:a16="http://schemas.microsoft.com/office/drawing/2014/main" val="992169908"/>
+                    </a:ext>
+                  </a:extLst>
+                </a:gridCol>
+                <a:gridCol w="1381563">
+                  <a:extLst>
+                    <a:ext uri="{9D8B030D-6E8A-4147-A177-3AD203B41FA5}">
+                      <a16:colId xmlns:a16="http://schemas.microsoft.com/office/drawing/2014/main" val="1588478479"/>
+                    </a:ext>
+                  </a:extLst>
+                </a:gridCol>
+                <a:gridCol w="1381563">
+                  <a:extLst>
+                    <a:ext uri="{9D8B030D-6E8A-4147-A177-3AD203B41FA5}">
+                      <a16:colId xmlns:a16="http://schemas.microsoft.com/office/drawing/2014/main" val="3658203024"/>
+                    </a:ext>
+                  </a:extLst>
+                </a:gridCol>
+              </a:tblGrid>
+              <a:tr h="370840">
+                <a:tc>
+                  <a:txBody>
+                    <a:bodyPr/>
+                    <a:lstStyle/>
+                    <a:p>
+                      <a:r>
+                        <a:rPr lang="en-US" dirty="0"/>
+                        <a:t>External Cost</a:t>
+                      </a:r>
+                    </a:p>
+                  </a:txBody>
+                  <a:tcPr>
+                    <a:lnL w="12700" cap="flat" cmpd="sng" algn="ctr">
+                      <a:solidFill>
+                        <a:schemeClr val="tx1"/>
+                      </a:solidFill>
+                      <a:prstDash val="solid"/>
+                      <a:round/>
+                      <a:headEnd type="none" w="med" len="med"/>
+                      <a:tailEnd type="none" w="med" len="med"/>
+                    </a:lnL>
+                  </a:tcPr>
+                </a:tc>
+                <a:tc>
+                  <a:txBody>
+                    <a:bodyPr/>
+                    <a:lstStyle/>
+                    <a:p>
+                      <a:r>
+                        <a:rPr lang="en-US" dirty="0"/>
+                        <a:t>Purpose</a:t>
+                      </a:r>
+                    </a:p>
+                  </a:txBody>
+                  <a:tcPr/>
+                </a:tc>
+                <a:tc>
+                  <a:txBody>
+                    <a:bodyPr/>
+                    <a:lstStyle/>
+                    <a:p>
+                      <a:r>
+                        <a:rPr lang="en-US" dirty="0"/>
+                        <a:t>Price Year 1</a:t>
+                      </a:r>
+                    </a:p>
+                  </a:txBody>
+                  <a:tcPr/>
+                </a:tc>
+                <a:tc>
+                  <a:txBody>
+                    <a:bodyPr/>
+                    <a:lstStyle/>
+                    <a:p>
+                      <a:r>
+                        <a:rPr lang="en-US" dirty="0"/>
+                        <a:t>Price Year 2</a:t>
+                      </a:r>
+                    </a:p>
+                  </a:txBody>
+                  <a:tcPr/>
+                </a:tc>
+                <a:tc>
+                  <a:txBody>
+                    <a:bodyPr/>
+                    <a:lstStyle/>
+                    <a:p>
+                      <a:r>
+                        <a:rPr lang="en-US" dirty="0"/>
+                        <a:t>Price Year 3</a:t>
+                      </a:r>
+                    </a:p>
+                  </a:txBody>
+                  <a:tcPr>
+                    <a:lnR w="12700" cap="flat" cmpd="sng" algn="ctr">
+                      <a:solidFill>
+                        <a:schemeClr val="tx1"/>
+                      </a:solidFill>
+                      <a:prstDash val="solid"/>
+                      <a:round/>
+                      <a:headEnd type="none" w="med" len="med"/>
+                      <a:tailEnd type="none" w="med" len="med"/>
+                    </a:lnR>
+                  </a:tcPr>
+                </a:tc>
+                <a:extLst>
+                  <a:ext uri="{0D108BD9-81ED-4DB2-BD59-A6C34878D82A}">
+                    <a16:rowId xmlns:a16="http://schemas.microsoft.com/office/drawing/2014/main" val="3966015360"/>
+                  </a:ext>
+                </a:extLst>
+              </a:tr>
+              <a:tr h="370840">
+                <a:tc>
+                  <a:txBody>
+                    <a:bodyPr/>
+                    <a:lstStyle/>
+                    <a:p>
+                      <a:r>
+                        <a:rPr lang="en-US" dirty="0"/>
+                        <a:t>Google Workspace</a:t>
+                      </a:r>
+                    </a:p>
+                  </a:txBody>
+                  <a:tcPr>
+                    <a:lnL w="12700" cap="flat" cmpd="sng" algn="ctr">
+                      <a:solidFill>
+                        <a:schemeClr val="tx1"/>
+                      </a:solidFill>
+                      <a:prstDash val="solid"/>
+                      <a:round/>
+                      <a:headEnd type="none" w="med" len="med"/>
+                      <a:tailEnd type="none" w="med" len="med"/>
+                    </a:lnL>
+                  </a:tcPr>
+                </a:tc>
+                <a:tc>
+                  <a:txBody>
+                    <a:bodyPr/>
+                    <a:lstStyle/>
+                    <a:p>
+                      <a:r>
+                        <a:rPr lang="en-US" dirty="0"/>
+                        <a:t>Document Transfer</a:t>
+                      </a:r>
+                    </a:p>
+                  </a:txBody>
+                  <a:tcPr/>
+                </a:tc>
+                <a:tc>
+                  <a:txBody>
+                    <a:bodyPr/>
+                    <a:lstStyle/>
+                    <a:p>
+                      <a:pPr algn="r" rtl="0" fontAlgn="b"/>
+                      <a:r>
+                        <a:rPr lang="en-US">
+                          <a:effectLst/>
+                        </a:rPr>
+                        <a:t>$144</a:t>
+                      </a:r>
+                    </a:p>
+                  </a:txBody>
+                  <a:tcPr marL="28575" marR="28575" marT="19050" marB="19050" anchor="b"/>
+                </a:tc>
+                <a:tc>
+                  <a:txBody>
+                    <a:bodyPr/>
+                    <a:lstStyle/>
+                    <a:p>
+                      <a:pPr algn="r" rtl="0" fontAlgn="b"/>
+                      <a:r>
+                        <a:rPr lang="en-US">
+                          <a:effectLst/>
+                        </a:rPr>
+                        <a:t>$144</a:t>
+                      </a:r>
+                    </a:p>
+                  </a:txBody>
+                  <a:tcPr marL="28575" marR="28575" marT="19050" marB="19050" anchor="b"/>
+                </a:tc>
+                <a:tc>
+                  <a:txBody>
+                    <a:bodyPr/>
+                    <a:lstStyle/>
+                    <a:p>
+                      <a:pPr algn="r" rtl="0" fontAlgn="b"/>
+                      <a:r>
+                        <a:rPr lang="en-US" dirty="0">
+                          <a:effectLst/>
+                        </a:rPr>
+                        <a:t>$144</a:t>
+                      </a:r>
+                    </a:p>
+                  </a:txBody>
+                  <a:tcPr marL="28575" marR="28575" marT="19050" marB="19050" anchor="b">
+                    <a:lnR w="12700" cap="flat" cmpd="sng" algn="ctr">
+                      <a:solidFill>
+                        <a:schemeClr val="tx1"/>
+                      </a:solidFill>
+                      <a:prstDash val="solid"/>
+                      <a:round/>
+                      <a:headEnd type="none" w="med" len="med"/>
+                      <a:tailEnd type="none" w="med" len="med"/>
+                    </a:lnR>
+                  </a:tcPr>
+                </a:tc>
+                <a:extLst>
+                  <a:ext uri="{0D108BD9-81ED-4DB2-BD59-A6C34878D82A}">
+                    <a16:rowId xmlns:a16="http://schemas.microsoft.com/office/drawing/2014/main" val="2072116671"/>
+                  </a:ext>
+                </a:extLst>
+              </a:tr>
+              <a:tr h="370840">
+                <a:tc>
+                  <a:txBody>
+                    <a:bodyPr/>
+                    <a:lstStyle/>
+                    <a:p>
+                      <a:pPr rtl="0" fontAlgn="b"/>
+                      <a:r>
+                        <a:rPr lang="en-US" dirty="0" err="1">
+                          <a:effectLst/>
+                        </a:rPr>
+                        <a:t>BigTime</a:t>
+                      </a:r>
+                      <a:r>
+                        <a:rPr lang="en-US" dirty="0">
+                          <a:effectLst/>
+                        </a:rPr>
+                        <a:t> (Pro)</a:t>
+                      </a:r>
+                    </a:p>
+                  </a:txBody>
+                  <a:tcPr marL="28575" marR="28575" marT="19050" marB="19050" anchor="b">
+                    <a:lnL w="12700" cap="flat" cmpd="sng" algn="ctr">
+                      <a:solidFill>
+                        <a:schemeClr val="tx1"/>
+                      </a:solidFill>
+                      <a:prstDash val="solid"/>
+                      <a:round/>
+                      <a:headEnd type="none" w="med" len="med"/>
+                      <a:tailEnd type="none" w="med" len="med"/>
+                    </a:lnL>
+                  </a:tcPr>
+                </a:tc>
+                <a:tc>
+                  <a:txBody>
+                    <a:bodyPr/>
+                    <a:lstStyle/>
+                    <a:p>
+                      <a:pPr rtl="0" fontAlgn="b"/>
+                      <a:r>
+                        <a:rPr lang="en-US">
+                          <a:effectLst/>
+                        </a:rPr>
+                        <a:t>Time Keeping, Billing, Notifications</a:t>
+                      </a:r>
+                    </a:p>
+                  </a:txBody>
+                  <a:tcPr marL="28575" marR="28575" marT="19050" marB="19050" anchor="b"/>
+                </a:tc>
+                <a:tc>
+                  <a:txBody>
+                    <a:bodyPr/>
+                    <a:lstStyle/>
+                    <a:p>
+                      <a:pPr algn="r" rtl="0" fontAlgn="b"/>
+                      <a:r>
+                        <a:rPr lang="en-US">
+                          <a:effectLst/>
+                        </a:rPr>
+                        <a:t>$1,800</a:t>
+                      </a:r>
+                    </a:p>
+                  </a:txBody>
+                  <a:tcPr marL="28575" marR="28575" marT="19050" marB="19050" anchor="b"/>
+                </a:tc>
+                <a:tc>
+                  <a:txBody>
+                    <a:bodyPr/>
+                    <a:lstStyle/>
+                    <a:p>
+                      <a:pPr algn="r" rtl="0" fontAlgn="b"/>
+                      <a:r>
+                        <a:rPr lang="en-US" dirty="0">
+                          <a:effectLst/>
+                        </a:rPr>
+                        <a:t>$1,800</a:t>
+                      </a:r>
+                    </a:p>
+                  </a:txBody>
+                  <a:tcPr marL="28575" marR="28575" marT="19050" marB="19050" anchor="b"/>
+                </a:tc>
+                <a:tc>
+                  <a:txBody>
+                    <a:bodyPr/>
+                    <a:lstStyle/>
+                    <a:p>
+                      <a:pPr algn="r" rtl="0" fontAlgn="b"/>
+                      <a:r>
+                        <a:rPr lang="en-US" dirty="0">
+                          <a:effectLst/>
+                        </a:rPr>
+                        <a:t>$1,800</a:t>
+                      </a:r>
+                    </a:p>
+                  </a:txBody>
+                  <a:tcPr marL="28575" marR="28575" marT="19050" marB="19050" anchor="b">
+                    <a:lnR w="12700" cap="flat" cmpd="sng" algn="ctr">
+                      <a:solidFill>
+                        <a:schemeClr val="tx1"/>
+                      </a:solidFill>
+                      <a:prstDash val="solid"/>
+                      <a:round/>
+                      <a:headEnd type="none" w="med" len="med"/>
+                      <a:tailEnd type="none" w="med" len="med"/>
+                    </a:lnR>
+                  </a:tcPr>
+                </a:tc>
+                <a:extLst>
+                  <a:ext uri="{0D108BD9-81ED-4DB2-BD59-A6C34878D82A}">
+                    <a16:rowId xmlns:a16="http://schemas.microsoft.com/office/drawing/2014/main" val="2320253476"/>
+                  </a:ext>
+                </a:extLst>
+              </a:tr>
+              <a:tr h="370840">
+                <a:tc>
+                  <a:txBody>
+                    <a:bodyPr/>
+                    <a:lstStyle/>
+                    <a:p>
+                      <a:pPr rtl="0" fontAlgn="b"/>
+                      <a:r>
+                        <a:rPr lang="en-US" dirty="0" err="1">
+                          <a:effectLst/>
+                        </a:rPr>
+                        <a:t>Shookum</a:t>
+                      </a:r>
+                      <a:endParaRPr lang="en-US" dirty="0">
+                        <a:effectLst/>
+                      </a:endParaRPr>
+                    </a:p>
+                  </a:txBody>
+                  <a:tcPr marL="28575" marR="28575" marT="19050" marB="19050" anchor="b">
+                    <a:lnL w="12700" cap="flat" cmpd="sng" algn="ctr">
+                      <a:solidFill>
+                        <a:schemeClr val="tx1"/>
+                      </a:solidFill>
+                      <a:prstDash val="solid"/>
+                      <a:round/>
+                      <a:headEnd type="none" w="med" len="med"/>
+                      <a:tailEnd type="none" w="med" len="med"/>
+                    </a:lnL>
+                  </a:tcPr>
+                </a:tc>
+                <a:tc>
+                  <a:txBody>
+                    <a:bodyPr/>
+                    <a:lstStyle/>
+                    <a:p>
+                      <a:pPr rtl="0" fontAlgn="b"/>
+                      <a:r>
+                        <a:rPr lang="en-US">
+                          <a:effectLst/>
+                        </a:rPr>
+                        <a:t>Advertisement Creation</a:t>
+                      </a:r>
+                    </a:p>
+                  </a:txBody>
+                  <a:tcPr marL="28575" marR="28575" marT="19050" marB="19050" anchor="b"/>
+                </a:tc>
+                <a:tc>
+                  <a:txBody>
+                    <a:bodyPr/>
+                    <a:lstStyle/>
+                    <a:p>
+                      <a:pPr algn="r" rtl="0" fontAlgn="b"/>
+                      <a:r>
+                        <a:rPr lang="en-US">
+                          <a:effectLst/>
+                        </a:rPr>
+                        <a:t>$3,000</a:t>
+                      </a:r>
+                    </a:p>
+                  </a:txBody>
+                  <a:tcPr marL="28575" marR="28575" marT="19050" marB="19050" anchor="b"/>
+                </a:tc>
+                <a:tc>
+                  <a:txBody>
+                    <a:bodyPr/>
+                    <a:lstStyle/>
+                    <a:p>
+                      <a:pPr algn="r" rtl="0" fontAlgn="b"/>
+                      <a:r>
+                        <a:rPr lang="en-US" dirty="0">
+                          <a:effectLst/>
+                        </a:rPr>
+                        <a:t>$2,000</a:t>
+                      </a:r>
+                    </a:p>
+                  </a:txBody>
+                  <a:tcPr marL="28575" marR="28575" marT="19050" marB="19050" anchor="b"/>
+                </a:tc>
+                <a:tc>
+                  <a:txBody>
+                    <a:bodyPr/>
+                    <a:lstStyle/>
+                    <a:p>
+                      <a:pPr algn="r" rtl="0" fontAlgn="b"/>
+                      <a:r>
+                        <a:rPr lang="en-US" dirty="0">
+                          <a:effectLst/>
+                        </a:rPr>
+                        <a:t>$2,000</a:t>
+                      </a:r>
+                    </a:p>
+                  </a:txBody>
+                  <a:tcPr marL="28575" marR="28575" marT="19050" marB="19050" anchor="b">
+                    <a:lnR w="12700" cap="flat" cmpd="sng" algn="ctr">
+                      <a:solidFill>
+                        <a:schemeClr val="tx1"/>
+                      </a:solidFill>
+                      <a:prstDash val="solid"/>
+                      <a:round/>
+                      <a:headEnd type="none" w="med" len="med"/>
+                      <a:tailEnd type="none" w="med" len="med"/>
+                    </a:lnR>
+                  </a:tcPr>
+                </a:tc>
+                <a:extLst>
+                  <a:ext uri="{0D108BD9-81ED-4DB2-BD59-A6C34878D82A}">
+                    <a16:rowId xmlns:a16="http://schemas.microsoft.com/office/drawing/2014/main" val="2618246687"/>
+                  </a:ext>
+                </a:extLst>
+              </a:tr>
+              <a:tr h="370840">
+                <a:tc>
+                  <a:txBody>
+                    <a:bodyPr/>
+                    <a:lstStyle/>
+                    <a:p>
+                      <a:pPr rtl="0" fontAlgn="b"/>
+                      <a:r>
+                        <a:rPr lang="en-US" dirty="0">
+                          <a:effectLst/>
+                        </a:rPr>
+                        <a:t>Meta Advertising</a:t>
+                      </a:r>
+                    </a:p>
+                  </a:txBody>
+                  <a:tcPr marL="28575" marR="28575" marT="19050" marB="19050" anchor="b">
+                    <a:lnL w="12700" cap="flat" cmpd="sng" algn="ctr">
+                      <a:solidFill>
+                        <a:schemeClr val="tx1"/>
+                      </a:solidFill>
+                      <a:prstDash val="solid"/>
+                      <a:round/>
+                      <a:headEnd type="none" w="med" len="med"/>
+                      <a:tailEnd type="none" w="med" len="med"/>
+                    </a:lnL>
+                    <a:lnB w="12700" cap="flat" cmpd="sng" algn="ctr">
+                      <a:solidFill>
+                        <a:schemeClr val="tx1"/>
+                      </a:solidFill>
+                      <a:prstDash val="solid"/>
+                      <a:round/>
+                      <a:headEnd type="none" w="med" len="med"/>
+                      <a:tailEnd type="none" w="med" len="med"/>
+                    </a:lnB>
+                  </a:tcPr>
+                </a:tc>
+                <a:tc>
+                  <a:txBody>
+                    <a:bodyPr/>
+                    <a:lstStyle/>
+                    <a:p>
+                      <a:pPr rtl="0" fontAlgn="b"/>
+                      <a:r>
+                        <a:rPr lang="en-US" dirty="0">
+                          <a:effectLst/>
+                        </a:rPr>
+                        <a:t>Advertisement Display</a:t>
+                      </a:r>
+                    </a:p>
+                  </a:txBody>
+                  <a:tcPr marL="28575" marR="28575" marT="19050" marB="19050" anchor="b">
+                    <a:lnB w="12700" cap="flat" cmpd="sng" algn="ctr">
+                      <a:solidFill>
+                        <a:schemeClr val="tx1"/>
+                      </a:solidFill>
+                      <a:prstDash val="solid"/>
+                      <a:round/>
+                      <a:headEnd type="none" w="med" len="med"/>
+                      <a:tailEnd type="none" w="med" len="med"/>
+                    </a:lnB>
+                  </a:tcPr>
+                </a:tc>
+                <a:tc>
+                  <a:txBody>
+                    <a:bodyPr/>
+                    <a:lstStyle/>
+                    <a:p>
+                      <a:pPr algn="r" rtl="0" fontAlgn="b"/>
+                      <a:r>
+                        <a:rPr lang="en-US" dirty="0">
+                          <a:effectLst/>
+                        </a:rPr>
+                        <a:t>$2,000</a:t>
+                      </a:r>
+                    </a:p>
+                  </a:txBody>
+                  <a:tcPr marL="28575" marR="28575" marT="19050" marB="19050" anchor="b">
+                    <a:lnB w="12700" cap="flat" cmpd="sng" algn="ctr">
+                      <a:solidFill>
+                        <a:schemeClr val="tx1"/>
+                      </a:solidFill>
+                      <a:prstDash val="solid"/>
+                      <a:round/>
+                      <a:headEnd type="none" w="med" len="med"/>
+                      <a:tailEnd type="none" w="med" len="med"/>
+                    </a:lnB>
+                  </a:tcPr>
+                </a:tc>
+                <a:tc>
+                  <a:txBody>
+                    <a:bodyPr/>
+                    <a:lstStyle/>
+                    <a:p>
+                      <a:pPr algn="r" rtl="0" fontAlgn="b"/>
+                      <a:r>
+                        <a:rPr lang="en-US" dirty="0">
+                          <a:effectLst/>
+                        </a:rPr>
+                        <a:t>$2,000</a:t>
+                      </a:r>
+                    </a:p>
+                  </a:txBody>
+                  <a:tcPr marL="28575" marR="28575" marT="19050" marB="19050" anchor="b">
+                    <a:lnB w="12700" cap="flat" cmpd="sng" algn="ctr">
+                      <a:solidFill>
+                        <a:schemeClr val="tx1"/>
+                      </a:solidFill>
+                      <a:prstDash val="solid"/>
+                      <a:round/>
+                      <a:headEnd type="none" w="med" len="med"/>
+                      <a:tailEnd type="none" w="med" len="med"/>
+                    </a:lnB>
+                  </a:tcPr>
+                </a:tc>
+                <a:tc>
+                  <a:txBody>
+                    <a:bodyPr/>
+                    <a:lstStyle/>
+                    <a:p>
+                      <a:pPr algn="r" rtl="0" fontAlgn="b"/>
+                      <a:r>
+                        <a:rPr lang="en-US" dirty="0">
+                          <a:effectLst/>
+                        </a:rPr>
+                        <a:t>$2,000</a:t>
+                      </a:r>
+                    </a:p>
+                  </a:txBody>
+                  <a:tcPr marL="28575" marR="28575" marT="19050" marB="19050" anchor="b">
+                    <a:lnR w="12700" cap="flat" cmpd="sng" algn="ctr">
+                      <a:solidFill>
+                        <a:schemeClr val="tx1"/>
+                      </a:solidFill>
+                      <a:prstDash val="solid"/>
+                      <a:round/>
+                      <a:headEnd type="none" w="med" len="med"/>
+                      <a:tailEnd type="none" w="med" len="med"/>
+                    </a:lnR>
+                    <a:lnB w="12700" cap="flat" cmpd="sng" algn="ctr">
+                      <a:solidFill>
+                        <a:schemeClr val="tx1"/>
+                      </a:solidFill>
+                      <a:prstDash val="solid"/>
+                      <a:round/>
+                      <a:headEnd type="none" w="med" len="med"/>
+                      <a:tailEnd type="none" w="med" len="med"/>
+                    </a:lnB>
+                  </a:tcPr>
+                </a:tc>
+                <a:extLst>
+                  <a:ext uri="{0D108BD9-81ED-4DB2-BD59-A6C34878D82A}">
+                    <a16:rowId xmlns:a16="http://schemas.microsoft.com/office/drawing/2014/main" val="744082753"/>
+                  </a:ext>
+                </a:extLst>
+              </a:tr>
+              <a:tr h="370840">
+                <a:tc>
+                  <a:txBody>
+                    <a:bodyPr/>
+                    <a:lstStyle/>
+                    <a:p>
+                      <a:pPr rtl="0" fontAlgn="b"/>
+                      <a:endParaRPr lang="en-US" dirty="0">
+                        <a:effectLst/>
+                      </a:endParaRPr>
+                    </a:p>
+                  </a:txBody>
+                  <a:tcPr marL="28575" marR="28575" marT="19050" marB="19050" anchor="b">
+                    <a:lnL w="12700" cap="flat" cmpd="sng" algn="ctr">
+                      <a:noFill/>
+                      <a:prstDash val="solid"/>
+                      <a:round/>
+                      <a:headEnd type="none" w="med" len="med"/>
+                      <a:tailEnd type="none" w="med" len="med"/>
+                    </a:lnL>
+                    <a:lnR>
+                      <a:noFill/>
+                    </a:lnR>
+                    <a:lnT w="12700" cap="flat" cmpd="sng" algn="ctr">
+                      <a:solidFill>
+                        <a:schemeClr val="tx1"/>
+                      </a:solidFill>
+                      <a:prstDash val="solid"/>
+                      <a:round/>
+                      <a:headEnd type="none" w="med" len="med"/>
+                      <a:tailEnd type="none" w="med" len="med"/>
+                    </a:lnT>
+                    <a:lnB w="12700" cap="flat" cmpd="sng" algn="ctr">
+                      <a:solidFill>
+                        <a:schemeClr val="tx1"/>
+                      </a:solidFill>
+                      <a:prstDash val="solid"/>
+                      <a:round/>
+                      <a:headEnd type="none" w="med" len="med"/>
+                      <a:tailEnd type="none" w="med" len="med"/>
+                    </a:lnB>
+                    <a:lnTlToBr w="12700" cmpd="sng">
+                      <a:noFill/>
+                      <a:prstDash val="solid"/>
+                    </a:lnTlToBr>
+                    <a:lnBlToTr w="12700" cmpd="sng">
+                      <a:noFill/>
+                      <a:prstDash val="solid"/>
+                    </a:lnBlToTr>
+                    <a:noFill/>
+                  </a:tcPr>
+                </a:tc>
+                <a:tc>
+                  <a:txBody>
+                    <a:bodyPr/>
+                    <a:lstStyle/>
+                    <a:p>
+                      <a:pPr rtl="0" fontAlgn="b"/>
+                      <a:endParaRPr lang="en-US" dirty="0">
+                        <a:effectLst/>
+                      </a:endParaRPr>
+                    </a:p>
+                  </a:txBody>
+                  <a:tcPr marL="28575" marR="28575" marT="19050" marB="19050" anchor="b">
+                    <a:lnL>
+                      <a:noFill/>
+                    </a:lnL>
+                    <a:lnR>
+                      <a:noFill/>
+                    </a:lnR>
+                    <a:lnT w="12700" cap="flat" cmpd="sng" algn="ctr">
+                      <a:solidFill>
+                        <a:schemeClr val="tx1"/>
+                      </a:solidFill>
+                      <a:prstDash val="solid"/>
+                      <a:round/>
+                      <a:headEnd type="none" w="med" len="med"/>
+                      <a:tailEnd type="none" w="med" len="med"/>
+                    </a:lnT>
+                    <a:lnB w="12700" cap="flat" cmpd="sng" algn="ctr">
+                      <a:solidFill>
+                        <a:schemeClr val="tx1"/>
+                      </a:solidFill>
+                      <a:prstDash val="solid"/>
+                      <a:round/>
+                      <a:headEnd type="none" w="med" len="med"/>
+                      <a:tailEnd type="none" w="med" len="med"/>
+                    </a:lnB>
+                    <a:lnTlToBr w="12700" cmpd="sng">
+                      <a:noFill/>
+                      <a:prstDash val="solid"/>
+                    </a:lnTlToBr>
+                    <a:lnBlToTr w="12700" cmpd="sng">
+                      <a:noFill/>
+                      <a:prstDash val="solid"/>
+                    </a:lnBlToTr>
+                    <a:noFill/>
+                  </a:tcPr>
+                </a:tc>
+                <a:tc>
+                  <a:txBody>
+                    <a:bodyPr/>
+                    <a:lstStyle/>
+                    <a:p>
+                      <a:pPr algn="r" rtl="0" fontAlgn="b"/>
+                      <a:endParaRPr lang="en-US" dirty="0">
+                        <a:effectLst/>
+                      </a:endParaRPr>
+                    </a:p>
+                  </a:txBody>
+                  <a:tcPr marL="28575" marR="28575" marT="19050" marB="19050" anchor="b">
+                    <a:lnL>
+                      <a:noFill/>
+                    </a:lnL>
+                    <a:lnR>
+                      <a:noFill/>
+                    </a:lnR>
+                    <a:lnT w="12700" cap="flat" cmpd="sng" algn="ctr">
+                      <a:solidFill>
+                        <a:schemeClr val="tx1"/>
+                      </a:solidFill>
+                      <a:prstDash val="solid"/>
+                      <a:round/>
+                      <a:headEnd type="none" w="med" len="med"/>
+                      <a:tailEnd type="none" w="med" len="med"/>
+                    </a:lnT>
+                    <a:lnB w="12700" cap="flat" cmpd="sng" algn="ctr">
+                      <a:solidFill>
+                        <a:schemeClr val="tx1"/>
+                      </a:solidFill>
+                      <a:prstDash val="solid"/>
+                      <a:round/>
+                      <a:headEnd type="none" w="med" len="med"/>
+                      <a:tailEnd type="none" w="med" len="med"/>
+                    </a:lnB>
+                    <a:lnTlToBr w="12700" cmpd="sng">
+                      <a:noFill/>
+                      <a:prstDash val="solid"/>
+                    </a:lnTlToBr>
+                    <a:lnBlToTr w="12700" cmpd="sng">
+                      <a:noFill/>
+                      <a:prstDash val="solid"/>
+                    </a:lnBlToTr>
+                    <a:noFill/>
+                  </a:tcPr>
+                </a:tc>
+                <a:tc>
+                  <a:txBody>
+                    <a:bodyPr/>
+                    <a:lstStyle/>
+                    <a:p>
+                      <a:pPr algn="r" rtl="0" fontAlgn="b"/>
+                      <a:endParaRPr lang="en-US" dirty="0">
+                        <a:effectLst/>
+                      </a:endParaRPr>
+                    </a:p>
+                  </a:txBody>
+                  <a:tcPr marL="28575" marR="28575" marT="19050" marB="19050" anchor="b">
+                    <a:lnL>
+                      <a:noFill/>
+                    </a:lnL>
+                    <a:lnR>
+                      <a:noFill/>
+                    </a:lnR>
+                    <a:lnT w="12700" cap="flat" cmpd="sng" algn="ctr">
+                      <a:solidFill>
+                        <a:schemeClr val="tx1"/>
+                      </a:solidFill>
+                      <a:prstDash val="solid"/>
+                      <a:round/>
+                      <a:headEnd type="none" w="med" len="med"/>
+                      <a:tailEnd type="none" w="med" len="med"/>
+                    </a:lnT>
+                    <a:lnB w="12700" cap="flat" cmpd="sng" algn="ctr">
+                      <a:solidFill>
+                        <a:schemeClr val="tx1"/>
+                      </a:solidFill>
+                      <a:prstDash val="solid"/>
+                      <a:round/>
+                      <a:headEnd type="none" w="med" len="med"/>
+                      <a:tailEnd type="none" w="med" len="med"/>
+                    </a:lnB>
+                    <a:lnTlToBr w="12700" cmpd="sng">
+                      <a:noFill/>
+                      <a:prstDash val="solid"/>
+                    </a:lnTlToBr>
+                    <a:lnBlToTr w="12700" cmpd="sng">
+                      <a:noFill/>
+                      <a:prstDash val="solid"/>
+                    </a:lnBlToTr>
+                    <a:noFill/>
+                  </a:tcPr>
+                </a:tc>
+                <a:tc>
+                  <a:txBody>
+                    <a:bodyPr/>
+                    <a:lstStyle/>
+                    <a:p>
+                      <a:pPr algn="r" rtl="0" fontAlgn="b"/>
+                      <a:endParaRPr lang="en-US" dirty="0">
+                        <a:effectLst/>
+                      </a:endParaRPr>
+                    </a:p>
+                  </a:txBody>
+                  <a:tcPr marL="28575" marR="28575" marT="19050" marB="19050" anchor="b">
+                    <a:lnL>
+                      <a:noFill/>
+                    </a:lnL>
+                    <a:lnR w="12700" cap="flat" cmpd="sng" algn="ctr">
+                      <a:noFill/>
+                      <a:prstDash val="solid"/>
+                      <a:round/>
+                      <a:headEnd type="none" w="med" len="med"/>
+                      <a:tailEnd type="none" w="med" len="med"/>
+                    </a:lnR>
+                    <a:lnT w="12700" cap="flat" cmpd="sng" algn="ctr">
+                      <a:solidFill>
+                        <a:schemeClr val="tx1"/>
+                      </a:solidFill>
+                      <a:prstDash val="solid"/>
+                      <a:round/>
+                      <a:headEnd type="none" w="med" len="med"/>
+                      <a:tailEnd type="none" w="med" len="med"/>
+                    </a:lnT>
+                    <a:lnB w="12700" cap="flat" cmpd="sng" algn="ctr">
+                      <a:solidFill>
+                        <a:schemeClr val="tx1"/>
+                      </a:solidFill>
+                      <a:prstDash val="solid"/>
+                      <a:round/>
+                      <a:headEnd type="none" w="med" len="med"/>
+                      <a:tailEnd type="none" w="med" len="med"/>
+                    </a:lnB>
+                    <a:lnTlToBr w="12700" cmpd="sng">
+                      <a:noFill/>
+                      <a:prstDash val="solid"/>
+                    </a:lnTlToBr>
+                    <a:lnBlToTr w="12700" cmpd="sng">
+                      <a:noFill/>
+                      <a:prstDash val="solid"/>
+                    </a:lnBlToTr>
+                    <a:noFill/>
+                  </a:tcPr>
+                </a:tc>
+                <a:extLst>
+                  <a:ext uri="{0D108BD9-81ED-4DB2-BD59-A6C34878D82A}">
+                    <a16:rowId xmlns:a16="http://schemas.microsoft.com/office/drawing/2014/main" val="2721063106"/>
+                  </a:ext>
+                </a:extLst>
+              </a:tr>
+              <a:tr h="370840">
+                <a:tc>
+                  <a:txBody>
+                    <a:bodyPr/>
+                    <a:lstStyle/>
+                    <a:p>
+                      <a:pPr rtl="0" fontAlgn="b"/>
+                      <a:r>
+                        <a:rPr lang="en-US" b="1" dirty="0">
+                          <a:effectLst/>
+                        </a:rPr>
+                        <a:t>Internal Cost</a:t>
+                      </a:r>
+                    </a:p>
+                  </a:txBody>
+                  <a:tcPr marL="28575" marR="28575" marT="19050" marB="19050" anchor="b">
+                    <a:lnL w="12700" cap="flat" cmpd="sng" algn="ctr">
+                      <a:solidFill>
+                        <a:schemeClr val="tx1"/>
+                      </a:solidFill>
+                      <a:prstDash val="solid"/>
+                      <a:round/>
+                      <a:headEnd type="none" w="med" len="med"/>
+                      <a:tailEnd type="none" w="med" len="med"/>
+                    </a:lnL>
+                    <a:lnT w="12700" cap="flat" cmpd="sng" algn="ctr">
+                      <a:solidFill>
+                        <a:schemeClr val="tx1"/>
+                      </a:solidFill>
+                      <a:prstDash val="solid"/>
+                      <a:round/>
+                      <a:headEnd type="none" w="med" len="med"/>
+                      <a:tailEnd type="none" w="med" len="med"/>
+                    </a:lnT>
+                    <a:lnB w="12700" cap="flat" cmpd="sng" algn="ctr">
+                      <a:solidFill>
+                        <a:schemeClr val="tx1"/>
+                      </a:solidFill>
+                      <a:prstDash val="solid"/>
+                      <a:round/>
+                      <a:headEnd type="none" w="med" len="med"/>
+                      <a:tailEnd type="none" w="med" len="med"/>
+                    </a:lnB>
+                    <a:solidFill>
+                      <a:schemeClr val="bg1">
+                        <a:alpha val="20000"/>
+                      </a:schemeClr>
+                    </a:solidFill>
+                  </a:tcPr>
+                </a:tc>
+                <a:tc>
+                  <a:txBody>
+                    <a:bodyPr/>
+                    <a:lstStyle/>
+                    <a:p>
+                      <a:pPr rtl="0" fontAlgn="b"/>
+                      <a:endParaRPr lang="en-US" dirty="0">
+                        <a:effectLst/>
+                      </a:endParaRPr>
+                    </a:p>
+                  </a:txBody>
+                  <a:tcPr marL="28575" marR="28575" marT="19050" marB="19050" anchor="b">
+                    <a:lnT w="12700" cap="flat" cmpd="sng" algn="ctr">
+                      <a:solidFill>
+                        <a:schemeClr val="tx1"/>
+                      </a:solidFill>
+                      <a:prstDash val="solid"/>
+                      <a:round/>
+                      <a:headEnd type="none" w="med" len="med"/>
+                      <a:tailEnd type="none" w="med" len="med"/>
+                    </a:lnT>
+                    <a:lnB w="12700" cap="flat" cmpd="sng" algn="ctr">
+                      <a:solidFill>
+                        <a:schemeClr val="tx1"/>
+                      </a:solidFill>
+                      <a:prstDash val="solid"/>
+                      <a:round/>
+                      <a:headEnd type="none" w="med" len="med"/>
+                      <a:tailEnd type="none" w="med" len="med"/>
+                    </a:lnB>
+                    <a:solidFill>
+                      <a:schemeClr val="bg1">
+                        <a:alpha val="20000"/>
+                      </a:schemeClr>
+                    </a:solidFill>
+                  </a:tcPr>
+                </a:tc>
+                <a:tc>
+                  <a:txBody>
+                    <a:bodyPr/>
+                    <a:lstStyle/>
+                    <a:p>
+                      <a:pPr rtl="0" fontAlgn="b"/>
+                      <a:endParaRPr lang="en-US" dirty="0">
+                        <a:effectLst/>
+                      </a:endParaRPr>
+                    </a:p>
+                  </a:txBody>
+                  <a:tcPr marL="28575" marR="28575" marT="19050" marB="19050" anchor="b">
+                    <a:lnT w="12700" cap="flat" cmpd="sng" algn="ctr">
+                      <a:solidFill>
+                        <a:schemeClr val="tx1"/>
+                      </a:solidFill>
+                      <a:prstDash val="solid"/>
+                      <a:round/>
+                      <a:headEnd type="none" w="med" len="med"/>
+                      <a:tailEnd type="none" w="med" len="med"/>
+                    </a:lnT>
+                    <a:lnB w="12700" cap="flat" cmpd="sng" algn="ctr">
+                      <a:solidFill>
+                        <a:schemeClr val="tx1"/>
+                      </a:solidFill>
+                      <a:prstDash val="solid"/>
+                      <a:round/>
+                      <a:headEnd type="none" w="med" len="med"/>
+                      <a:tailEnd type="none" w="med" len="med"/>
+                    </a:lnB>
+                    <a:solidFill>
+                      <a:schemeClr val="bg1">
+                        <a:alpha val="20000"/>
+                      </a:schemeClr>
+                    </a:solidFill>
+                  </a:tcPr>
+                </a:tc>
+                <a:tc>
+                  <a:txBody>
+                    <a:bodyPr/>
+                    <a:lstStyle/>
+                    <a:p>
+                      <a:pPr rtl="0" fontAlgn="b"/>
+                      <a:endParaRPr lang="en-US" dirty="0">
+                        <a:effectLst/>
+                      </a:endParaRPr>
+                    </a:p>
+                  </a:txBody>
+                  <a:tcPr marL="28575" marR="28575" marT="19050" marB="19050" anchor="b">
+                    <a:lnT w="12700" cap="flat" cmpd="sng" algn="ctr">
+                      <a:solidFill>
+                        <a:schemeClr val="tx1"/>
+                      </a:solidFill>
+                      <a:prstDash val="solid"/>
+                      <a:round/>
+                      <a:headEnd type="none" w="med" len="med"/>
+                      <a:tailEnd type="none" w="med" len="med"/>
+                    </a:lnT>
+                    <a:lnB w="12700" cap="flat" cmpd="sng" algn="ctr">
+                      <a:solidFill>
+                        <a:schemeClr val="tx1"/>
+                      </a:solidFill>
+                      <a:prstDash val="solid"/>
+                      <a:round/>
+                      <a:headEnd type="none" w="med" len="med"/>
+                      <a:tailEnd type="none" w="med" len="med"/>
+                    </a:lnB>
+                    <a:solidFill>
+                      <a:schemeClr val="bg1">
+                        <a:alpha val="20000"/>
+                      </a:schemeClr>
+                    </a:solidFill>
+                  </a:tcPr>
+                </a:tc>
+                <a:tc>
+                  <a:txBody>
+                    <a:bodyPr/>
+                    <a:lstStyle/>
+                    <a:p>
+                      <a:pPr rtl="0" fontAlgn="b"/>
+                      <a:endParaRPr lang="en-US" dirty="0">
+                        <a:effectLst/>
+                      </a:endParaRPr>
+                    </a:p>
+                  </a:txBody>
+                  <a:tcPr marL="28575" marR="28575" marT="19050" marB="19050" anchor="b">
+                    <a:lnR w="12700" cap="flat" cmpd="sng" algn="ctr">
+                      <a:solidFill>
+                        <a:schemeClr val="tx1"/>
+                      </a:solidFill>
+                      <a:prstDash val="solid"/>
+                      <a:round/>
+                      <a:headEnd type="none" w="med" len="med"/>
+                      <a:tailEnd type="none" w="med" len="med"/>
+                    </a:lnR>
+                    <a:lnT w="12700" cap="flat" cmpd="sng" algn="ctr">
+                      <a:solidFill>
+                        <a:schemeClr val="tx1"/>
+                      </a:solidFill>
+                      <a:prstDash val="solid"/>
+                      <a:round/>
+                      <a:headEnd type="none" w="med" len="med"/>
+                      <a:tailEnd type="none" w="med" len="med"/>
+                    </a:lnT>
+                    <a:lnB w="12700" cap="flat" cmpd="sng" algn="ctr">
+                      <a:solidFill>
+                        <a:schemeClr val="tx1"/>
+                      </a:solidFill>
+                      <a:prstDash val="solid"/>
+                      <a:round/>
+                      <a:headEnd type="none" w="med" len="med"/>
+                      <a:tailEnd type="none" w="med" len="med"/>
+                    </a:lnB>
+                    <a:solidFill>
+                      <a:schemeClr val="bg1">
+                        <a:alpha val="20000"/>
+                      </a:schemeClr>
+                    </a:solidFill>
+                  </a:tcPr>
+                </a:tc>
+                <a:extLst>
+                  <a:ext uri="{0D108BD9-81ED-4DB2-BD59-A6C34878D82A}">
+                    <a16:rowId xmlns:a16="http://schemas.microsoft.com/office/drawing/2014/main" val="3411564193"/>
+                  </a:ext>
+                </a:extLst>
+              </a:tr>
+              <a:tr h="370840">
+                <a:tc>
+                  <a:txBody>
+                    <a:bodyPr/>
+                    <a:lstStyle/>
+                    <a:p>
+                      <a:pPr rtl="0" fontAlgn="b"/>
+                      <a:r>
+                        <a:rPr lang="en-US" dirty="0">
+                          <a:effectLst/>
+                        </a:rPr>
+                        <a:t>Training</a:t>
+                      </a:r>
+                    </a:p>
+                  </a:txBody>
+                  <a:tcPr marL="28575" marR="28575" marT="19050" marB="19050" anchor="b">
+                    <a:lnL w="12700" cap="flat" cmpd="sng" algn="ctr">
+                      <a:solidFill>
+                        <a:schemeClr val="tx1"/>
+                      </a:solidFill>
+                      <a:prstDash val="solid"/>
+                      <a:round/>
+                      <a:headEnd type="none" w="med" len="med"/>
+                      <a:tailEnd type="none" w="med" len="med"/>
+                    </a:lnL>
+                    <a:lnT w="12700" cap="flat" cmpd="sng" algn="ctr">
+                      <a:solidFill>
+                        <a:schemeClr val="tx1"/>
+                      </a:solidFill>
+                      <a:prstDash val="solid"/>
+                      <a:round/>
+                      <a:headEnd type="none" w="med" len="med"/>
+                      <a:tailEnd type="none" w="med" len="med"/>
+                    </a:lnT>
+                    <a:lnB w="12700" cap="flat" cmpd="sng" algn="ctr">
+                      <a:solidFill>
+                        <a:schemeClr val="tx1"/>
+                      </a:solidFill>
+                      <a:prstDash val="solid"/>
+                      <a:round/>
+                      <a:headEnd type="none" w="med" len="med"/>
+                      <a:tailEnd type="none" w="med" len="med"/>
+                    </a:lnB>
+                  </a:tcPr>
+                </a:tc>
+                <a:tc>
+                  <a:txBody>
+                    <a:bodyPr/>
+                    <a:lstStyle/>
+                    <a:p>
+                      <a:pPr rtl="0" fontAlgn="b"/>
+                      <a:r>
+                        <a:rPr lang="en-US">
+                          <a:effectLst/>
+                        </a:rPr>
+                        <a:t>Training in Solutions Above</a:t>
+                      </a:r>
+                    </a:p>
+                  </a:txBody>
+                  <a:tcPr marL="28575" marR="28575" marT="19050" marB="19050" anchor="b">
+                    <a:lnT w="12700" cap="flat" cmpd="sng" algn="ctr">
+                      <a:solidFill>
+                        <a:schemeClr val="tx1"/>
+                      </a:solidFill>
+                      <a:prstDash val="solid"/>
+                      <a:round/>
+                      <a:headEnd type="none" w="med" len="med"/>
+                      <a:tailEnd type="none" w="med" len="med"/>
+                    </a:lnT>
+                    <a:lnB w="12700" cap="flat" cmpd="sng" algn="ctr">
+                      <a:solidFill>
+                        <a:schemeClr val="tx1"/>
+                      </a:solidFill>
+                      <a:prstDash val="solid"/>
+                      <a:round/>
+                      <a:headEnd type="none" w="med" len="med"/>
+                      <a:tailEnd type="none" w="med" len="med"/>
+                    </a:lnB>
+                  </a:tcPr>
+                </a:tc>
+                <a:tc>
+                  <a:txBody>
+                    <a:bodyPr/>
+                    <a:lstStyle/>
+                    <a:p>
+                      <a:pPr algn="r" rtl="0" fontAlgn="b"/>
+                      <a:r>
+                        <a:rPr lang="en-US">
+                          <a:effectLst/>
+                        </a:rPr>
+                        <a:t>$1,000</a:t>
+                      </a:r>
+                    </a:p>
+                  </a:txBody>
+                  <a:tcPr marL="28575" marR="28575" marT="19050" marB="19050" anchor="b">
+                    <a:lnT w="12700" cap="flat" cmpd="sng" algn="ctr">
+                      <a:solidFill>
+                        <a:schemeClr val="tx1"/>
+                      </a:solidFill>
+                      <a:prstDash val="solid"/>
+                      <a:round/>
+                      <a:headEnd type="none" w="med" len="med"/>
+                      <a:tailEnd type="none" w="med" len="med"/>
+                    </a:lnT>
+                    <a:lnB w="12700" cap="flat" cmpd="sng" algn="ctr">
+                      <a:solidFill>
+                        <a:schemeClr val="tx1"/>
+                      </a:solidFill>
+                      <a:prstDash val="solid"/>
+                      <a:round/>
+                      <a:headEnd type="none" w="med" len="med"/>
+                      <a:tailEnd type="none" w="med" len="med"/>
+                    </a:lnB>
+                  </a:tcPr>
+                </a:tc>
+                <a:tc>
+                  <a:txBody>
+                    <a:bodyPr/>
+                    <a:lstStyle/>
+                    <a:p>
+                      <a:pPr algn="r" rtl="0" fontAlgn="b"/>
+                      <a:r>
+                        <a:rPr lang="en-US">
+                          <a:effectLst/>
+                        </a:rPr>
+                        <a:t>$0</a:t>
+                      </a:r>
+                    </a:p>
+                  </a:txBody>
+                  <a:tcPr marL="28575" marR="28575" marT="19050" marB="19050" anchor="b">
+                    <a:lnT w="12700" cap="flat" cmpd="sng" algn="ctr">
+                      <a:solidFill>
+                        <a:schemeClr val="tx1"/>
+                      </a:solidFill>
+                      <a:prstDash val="solid"/>
+                      <a:round/>
+                      <a:headEnd type="none" w="med" len="med"/>
+                      <a:tailEnd type="none" w="med" len="med"/>
+                    </a:lnT>
+                    <a:lnB w="12700" cap="flat" cmpd="sng" algn="ctr">
+                      <a:solidFill>
+                        <a:schemeClr val="tx1"/>
+                      </a:solidFill>
+                      <a:prstDash val="solid"/>
+                      <a:round/>
+                      <a:headEnd type="none" w="med" len="med"/>
+                      <a:tailEnd type="none" w="med" len="med"/>
+                    </a:lnB>
+                  </a:tcPr>
+                </a:tc>
+                <a:tc>
+                  <a:txBody>
+                    <a:bodyPr/>
+                    <a:lstStyle/>
+                    <a:p>
+                      <a:pPr algn="r" rtl="0" fontAlgn="b"/>
+                      <a:r>
+                        <a:rPr lang="en-US" dirty="0">
+                          <a:effectLst/>
+                        </a:rPr>
+                        <a:t>$0</a:t>
+                      </a:r>
+                    </a:p>
+                  </a:txBody>
+                  <a:tcPr marL="28575" marR="28575" marT="19050" marB="19050" anchor="b">
+                    <a:lnR w="12700" cap="flat" cmpd="sng" algn="ctr">
+                      <a:solidFill>
+                        <a:schemeClr val="tx1"/>
+                      </a:solidFill>
+                      <a:prstDash val="solid"/>
+                      <a:round/>
+                      <a:headEnd type="none" w="med" len="med"/>
+                      <a:tailEnd type="none" w="med" len="med"/>
+                    </a:lnR>
+                    <a:lnT w="12700" cap="flat" cmpd="sng" algn="ctr">
+                      <a:solidFill>
+                        <a:schemeClr val="tx1"/>
+                      </a:solidFill>
+                      <a:prstDash val="solid"/>
+                      <a:round/>
+                      <a:headEnd type="none" w="med" len="med"/>
+                      <a:tailEnd type="none" w="med" len="med"/>
+                    </a:lnT>
+                    <a:lnB w="12700" cap="flat" cmpd="sng" algn="ctr">
+                      <a:solidFill>
+                        <a:schemeClr val="tx1"/>
+                      </a:solidFill>
+                      <a:prstDash val="solid"/>
+                      <a:round/>
+                      <a:headEnd type="none" w="med" len="med"/>
+                      <a:tailEnd type="none" w="med" len="med"/>
+                    </a:lnB>
+                  </a:tcPr>
+                </a:tc>
+                <a:extLst>
+                  <a:ext uri="{0D108BD9-81ED-4DB2-BD59-A6C34878D82A}">
+                    <a16:rowId xmlns:a16="http://schemas.microsoft.com/office/drawing/2014/main" val="304209025"/>
+                  </a:ext>
+                </a:extLst>
+              </a:tr>
+              <a:tr h="370840">
+                <a:tc>
+                  <a:txBody>
+                    <a:bodyPr/>
+                    <a:lstStyle/>
+                    <a:p>
+                      <a:pPr rtl="0" fontAlgn="b"/>
+                      <a:endParaRPr lang="en-US" dirty="0">
+                        <a:effectLst/>
+                      </a:endParaRPr>
+                    </a:p>
+                  </a:txBody>
+                  <a:tcPr marL="28575" marR="28575" marT="19050" marB="19050" anchor="b">
+                    <a:lnL w="12700" cap="flat" cmpd="sng" algn="ctr">
+                      <a:noFill/>
+                      <a:prstDash val="solid"/>
+                      <a:round/>
+                      <a:headEnd type="none" w="med" len="med"/>
+                      <a:tailEnd type="none" w="med" len="med"/>
+                    </a:lnL>
+                    <a:lnR>
+                      <a:noFill/>
+                    </a:lnR>
+                    <a:lnT w="12700" cap="flat" cmpd="sng" algn="ctr">
+                      <a:solidFill>
+                        <a:schemeClr val="tx1"/>
+                      </a:solidFill>
+                      <a:prstDash val="solid"/>
+                      <a:round/>
+                      <a:headEnd type="none" w="med" len="med"/>
+                      <a:tailEnd type="none" w="med" len="med"/>
+                    </a:lnT>
+                    <a:lnB w="12700" cap="flat" cmpd="sng" algn="ctr">
+                      <a:solidFill>
+                        <a:schemeClr val="tx1"/>
+                      </a:solidFill>
+                      <a:prstDash val="solid"/>
+                      <a:round/>
+                      <a:headEnd type="none" w="med" len="med"/>
+                      <a:tailEnd type="none" w="med" len="med"/>
+                    </a:lnB>
+                    <a:lnTlToBr w="12700" cmpd="sng">
+                      <a:noFill/>
+                      <a:prstDash val="solid"/>
+                    </a:lnTlToBr>
+                    <a:lnBlToTr w="12700" cmpd="sng">
+                      <a:noFill/>
+                      <a:prstDash val="solid"/>
+                    </a:lnBlToTr>
+                    <a:noFill/>
+                  </a:tcPr>
+                </a:tc>
+                <a:tc>
+                  <a:txBody>
+                    <a:bodyPr/>
+                    <a:lstStyle/>
+                    <a:p>
+                      <a:pPr rtl="0" fontAlgn="b"/>
+                      <a:endParaRPr lang="en-US" dirty="0">
+                        <a:effectLst/>
+                      </a:endParaRPr>
+                    </a:p>
+                  </a:txBody>
+                  <a:tcPr marL="28575" marR="28575" marT="19050" marB="19050" anchor="b">
+                    <a:lnL>
+                      <a:noFill/>
+                    </a:lnL>
+                    <a:lnR>
+                      <a:noFill/>
+                    </a:lnR>
+                    <a:lnT w="12700" cap="flat" cmpd="sng" algn="ctr">
+                      <a:solidFill>
+                        <a:schemeClr val="tx1"/>
+                      </a:solidFill>
+                      <a:prstDash val="solid"/>
+                      <a:round/>
+                      <a:headEnd type="none" w="med" len="med"/>
+                      <a:tailEnd type="none" w="med" len="med"/>
+                    </a:lnT>
+                    <a:lnB w="12700" cap="flat" cmpd="sng" algn="ctr">
+                      <a:solidFill>
+                        <a:schemeClr val="tx1"/>
+                      </a:solidFill>
+                      <a:prstDash val="solid"/>
+                      <a:round/>
+                      <a:headEnd type="none" w="med" len="med"/>
+                      <a:tailEnd type="none" w="med" len="med"/>
+                    </a:lnB>
+                    <a:lnTlToBr w="12700" cmpd="sng">
+                      <a:noFill/>
+                      <a:prstDash val="solid"/>
+                    </a:lnTlToBr>
+                    <a:lnBlToTr w="12700" cmpd="sng">
+                      <a:noFill/>
+                      <a:prstDash val="solid"/>
+                    </a:lnBlToTr>
+                    <a:noFill/>
+                  </a:tcPr>
+                </a:tc>
+                <a:tc>
+                  <a:txBody>
+                    <a:bodyPr/>
+                    <a:lstStyle/>
+                    <a:p>
+                      <a:pPr algn="r" rtl="0" fontAlgn="b"/>
+                      <a:endParaRPr lang="en-US" dirty="0">
+                        <a:effectLst/>
+                      </a:endParaRPr>
+                    </a:p>
+                  </a:txBody>
+                  <a:tcPr marL="28575" marR="28575" marT="19050" marB="19050" anchor="b">
+                    <a:lnL>
+                      <a:noFill/>
+                    </a:lnL>
+                    <a:lnR>
+                      <a:noFill/>
+                    </a:lnR>
+                    <a:lnT w="12700" cap="flat" cmpd="sng" algn="ctr">
+                      <a:solidFill>
+                        <a:schemeClr val="tx1"/>
+                      </a:solidFill>
+                      <a:prstDash val="solid"/>
+                      <a:round/>
+                      <a:headEnd type="none" w="med" len="med"/>
+                      <a:tailEnd type="none" w="med" len="med"/>
+                    </a:lnT>
+                    <a:lnB w="12700" cap="flat" cmpd="sng" algn="ctr">
+                      <a:solidFill>
+                        <a:schemeClr val="tx1"/>
+                      </a:solidFill>
+                      <a:prstDash val="solid"/>
+                      <a:round/>
+                      <a:headEnd type="none" w="med" len="med"/>
+                      <a:tailEnd type="none" w="med" len="med"/>
+                    </a:lnB>
+                    <a:lnTlToBr w="12700" cmpd="sng">
+                      <a:noFill/>
+                      <a:prstDash val="solid"/>
+                    </a:lnTlToBr>
+                    <a:lnBlToTr w="12700" cmpd="sng">
+                      <a:noFill/>
+                      <a:prstDash val="solid"/>
+                    </a:lnBlToTr>
+                    <a:noFill/>
+                  </a:tcPr>
+                </a:tc>
+                <a:tc>
+                  <a:txBody>
+                    <a:bodyPr/>
+                    <a:lstStyle/>
+                    <a:p>
+                      <a:pPr algn="r" rtl="0" fontAlgn="b"/>
+                      <a:endParaRPr lang="en-US" dirty="0">
+                        <a:effectLst/>
+                      </a:endParaRPr>
+                    </a:p>
+                  </a:txBody>
+                  <a:tcPr marL="28575" marR="28575" marT="19050" marB="19050" anchor="b">
+                    <a:lnL>
+                      <a:noFill/>
+                    </a:lnL>
+                    <a:lnR>
+                      <a:noFill/>
+                    </a:lnR>
+                    <a:lnT w="12700" cap="flat" cmpd="sng" algn="ctr">
+                      <a:solidFill>
+                        <a:schemeClr val="tx1"/>
+                      </a:solidFill>
+                      <a:prstDash val="solid"/>
+                      <a:round/>
+                      <a:headEnd type="none" w="med" len="med"/>
+                      <a:tailEnd type="none" w="med" len="med"/>
+                    </a:lnT>
+                    <a:lnB w="12700" cap="flat" cmpd="sng" algn="ctr">
+                      <a:solidFill>
+                        <a:schemeClr val="tx1"/>
+                      </a:solidFill>
+                      <a:prstDash val="solid"/>
+                      <a:round/>
+                      <a:headEnd type="none" w="med" len="med"/>
+                      <a:tailEnd type="none" w="med" len="med"/>
+                    </a:lnB>
+                    <a:lnTlToBr w="12700" cmpd="sng">
+                      <a:noFill/>
+                      <a:prstDash val="solid"/>
+                    </a:lnTlToBr>
+                    <a:lnBlToTr w="12700" cmpd="sng">
+                      <a:noFill/>
+                      <a:prstDash val="solid"/>
+                    </a:lnBlToTr>
+                    <a:noFill/>
+                  </a:tcPr>
+                </a:tc>
+                <a:tc>
+                  <a:txBody>
+                    <a:bodyPr/>
+                    <a:lstStyle/>
+                    <a:p>
+                      <a:pPr algn="r" rtl="0" fontAlgn="b"/>
+                      <a:endParaRPr lang="en-US" dirty="0">
+                        <a:effectLst/>
+                      </a:endParaRPr>
+                    </a:p>
+                  </a:txBody>
+                  <a:tcPr marL="28575" marR="28575" marT="19050" marB="19050" anchor="b">
+                    <a:lnL>
+                      <a:noFill/>
+                    </a:lnL>
+                    <a:lnR w="12700" cap="flat" cmpd="sng" algn="ctr">
+                      <a:noFill/>
+                      <a:prstDash val="solid"/>
+                      <a:round/>
+                      <a:headEnd type="none" w="med" len="med"/>
+                      <a:tailEnd type="none" w="med" len="med"/>
+                    </a:lnR>
+                    <a:lnT w="12700" cap="flat" cmpd="sng" algn="ctr">
+                      <a:solidFill>
+                        <a:schemeClr val="tx1"/>
+                      </a:solidFill>
+                      <a:prstDash val="solid"/>
+                      <a:round/>
+                      <a:headEnd type="none" w="med" len="med"/>
+                      <a:tailEnd type="none" w="med" len="med"/>
+                    </a:lnT>
+                    <a:lnB w="12700" cap="flat" cmpd="sng" algn="ctr">
+                      <a:solidFill>
+                        <a:schemeClr val="tx1"/>
+                      </a:solidFill>
+                      <a:prstDash val="solid"/>
+                      <a:round/>
+                      <a:headEnd type="none" w="med" len="med"/>
+                      <a:tailEnd type="none" w="med" len="med"/>
+                    </a:lnB>
+                    <a:lnTlToBr w="12700" cmpd="sng">
+                      <a:noFill/>
+                      <a:prstDash val="solid"/>
+                    </a:lnTlToBr>
+                    <a:lnBlToTr w="12700" cmpd="sng">
+                      <a:noFill/>
+                      <a:prstDash val="solid"/>
+                    </a:lnBlToTr>
+                    <a:noFill/>
+                  </a:tcPr>
+                </a:tc>
+                <a:extLst>
+                  <a:ext uri="{0D108BD9-81ED-4DB2-BD59-A6C34878D82A}">
+                    <a16:rowId xmlns:a16="http://schemas.microsoft.com/office/drawing/2014/main" val="766628623"/>
+                  </a:ext>
+                </a:extLst>
+              </a:tr>
+              <a:tr h="370840">
+                <a:tc>
+                  <a:txBody>
+                    <a:bodyPr/>
+                    <a:lstStyle/>
+                    <a:p>
+                      <a:pPr rtl="0" fontAlgn="b"/>
+                      <a:r>
+                        <a:rPr lang="en-US" b="1" dirty="0">
+                          <a:effectLst/>
+                        </a:rPr>
+                        <a:t>Total</a:t>
+                      </a:r>
+                    </a:p>
+                  </a:txBody>
+                  <a:tcPr marL="28575" marR="28575" marT="19050" marB="19050" anchor="b">
+                    <a:lnL w="12700" cap="flat" cmpd="sng" algn="ctr">
+                      <a:solidFill>
+                        <a:schemeClr val="tx1"/>
+                      </a:solidFill>
+                      <a:prstDash val="solid"/>
+                      <a:round/>
+                      <a:headEnd type="none" w="med" len="med"/>
+                      <a:tailEnd type="none" w="med" len="med"/>
+                    </a:lnL>
+                    <a:lnT w="12700" cap="flat" cmpd="sng" algn="ctr">
+                      <a:solidFill>
+                        <a:schemeClr val="tx1"/>
+                      </a:solidFill>
+                      <a:prstDash val="solid"/>
+                      <a:round/>
+                      <a:headEnd type="none" w="med" len="med"/>
+                      <a:tailEnd type="none" w="med" len="med"/>
+                    </a:lnT>
+                    <a:solidFill>
+                      <a:schemeClr val="bg1">
+                        <a:alpha val="20000"/>
+                      </a:schemeClr>
+                    </a:solidFill>
+                  </a:tcPr>
+                </a:tc>
+                <a:tc>
+                  <a:txBody>
+                    <a:bodyPr/>
+                    <a:lstStyle/>
+                    <a:p>
+                      <a:pPr rtl="0" fontAlgn="b"/>
+                      <a:endParaRPr lang="en-US" dirty="0">
+                        <a:effectLst/>
+                      </a:endParaRPr>
+                    </a:p>
+                  </a:txBody>
+                  <a:tcPr marL="28575" marR="28575" marT="19050" marB="19050" anchor="b">
+                    <a:lnT w="12700" cap="flat" cmpd="sng" algn="ctr">
+                      <a:solidFill>
+                        <a:schemeClr val="tx1"/>
+                      </a:solidFill>
+                      <a:prstDash val="solid"/>
+                      <a:round/>
+                      <a:headEnd type="none" w="med" len="med"/>
+                      <a:tailEnd type="none" w="med" len="med"/>
+                    </a:lnT>
+                    <a:solidFill>
+                      <a:schemeClr val="bg1">
+                        <a:alpha val="20000"/>
+                      </a:schemeClr>
+                    </a:solidFill>
+                  </a:tcPr>
+                </a:tc>
+                <a:tc>
+                  <a:txBody>
+                    <a:bodyPr/>
+                    <a:lstStyle/>
+                    <a:p>
+                      <a:pPr algn="r" rtl="0" fontAlgn="b"/>
+                      <a:r>
+                        <a:rPr lang="en-US" dirty="0">
+                          <a:effectLst/>
+                        </a:rPr>
+                        <a:t>$7,944</a:t>
+                      </a:r>
+                    </a:p>
+                  </a:txBody>
+                  <a:tcPr marL="28575" marR="28575" marT="19050" marB="19050" anchor="b">
+                    <a:lnT w="12700" cap="flat" cmpd="sng" algn="ctr">
+                      <a:solidFill>
+                        <a:schemeClr val="tx1"/>
+                      </a:solidFill>
+                      <a:prstDash val="solid"/>
+                      <a:round/>
+                      <a:headEnd type="none" w="med" len="med"/>
+                      <a:tailEnd type="none" w="med" len="med"/>
+                    </a:lnT>
+                    <a:solidFill>
+                      <a:schemeClr val="bg1">
+                        <a:alpha val="20000"/>
+                      </a:schemeClr>
+                    </a:solidFill>
+                  </a:tcPr>
+                </a:tc>
+                <a:tc>
+                  <a:txBody>
+                    <a:bodyPr/>
+                    <a:lstStyle/>
+                    <a:p>
+                      <a:pPr algn="r" rtl="0" fontAlgn="b"/>
+                      <a:r>
+                        <a:rPr lang="en-US" dirty="0">
+                          <a:effectLst/>
+                        </a:rPr>
+                        <a:t>$5,944</a:t>
+                      </a:r>
+                    </a:p>
+                  </a:txBody>
+                  <a:tcPr marL="28575" marR="28575" marT="19050" marB="19050" anchor="b">
+                    <a:lnT w="12700" cap="flat" cmpd="sng" algn="ctr">
+                      <a:solidFill>
+                        <a:schemeClr val="tx1"/>
+                      </a:solidFill>
+                      <a:prstDash val="solid"/>
+                      <a:round/>
+                      <a:headEnd type="none" w="med" len="med"/>
+                      <a:tailEnd type="none" w="med" len="med"/>
+                    </a:lnT>
+                    <a:solidFill>
+                      <a:schemeClr val="bg1">
+                        <a:alpha val="20000"/>
+                      </a:schemeClr>
+                    </a:solidFill>
+                  </a:tcPr>
+                </a:tc>
+                <a:tc>
+                  <a:txBody>
+                    <a:bodyPr/>
+                    <a:lstStyle/>
+                    <a:p>
+                      <a:pPr algn="r" rtl="0" fontAlgn="b"/>
+                      <a:r>
+                        <a:rPr lang="en-US" dirty="0">
+                          <a:effectLst/>
+                        </a:rPr>
+                        <a:t>$5,944</a:t>
+                      </a:r>
+                    </a:p>
+                  </a:txBody>
+                  <a:tcPr marL="28575" marR="28575" marT="19050" marB="19050" anchor="b">
+                    <a:lnR w="12700" cap="flat" cmpd="sng" algn="ctr">
+                      <a:solidFill>
+                        <a:schemeClr val="tx1"/>
+                      </a:solidFill>
+                      <a:prstDash val="solid"/>
+                      <a:round/>
+                      <a:headEnd type="none" w="med" len="med"/>
+                      <a:tailEnd type="none" w="med" len="med"/>
+                    </a:lnR>
+                    <a:lnT w="12700" cap="flat" cmpd="sng" algn="ctr">
+                      <a:solidFill>
+                        <a:schemeClr val="tx1"/>
+                      </a:solidFill>
+                      <a:prstDash val="solid"/>
+                      <a:round/>
+                      <a:headEnd type="none" w="med" len="med"/>
+                      <a:tailEnd type="none" w="med" len="med"/>
+                    </a:lnT>
+                    <a:solidFill>
+                      <a:schemeClr val="bg1">
+                        <a:alpha val="20000"/>
+                      </a:schemeClr>
+                    </a:solidFill>
+                  </a:tcPr>
+                </a:tc>
+                <a:extLst>
+                  <a:ext uri="{0D108BD9-81ED-4DB2-BD59-A6C34878D82A}">
+                    <a16:rowId xmlns:a16="http://schemas.microsoft.com/office/drawing/2014/main" val="860300593"/>
+                  </a:ext>
+                </a:extLst>
+              </a:tr>
+            </a:tbl>
+          </a:graphicData>
+        </a:graphic>
+      </p:graphicFrame>
     </p:spTree>
     <p:extLst>
       <p:ext uri="{BB962C8B-B14F-4D97-AF65-F5344CB8AC3E}">
-        <p14:creationId xmlns:p14="http://schemas.microsoft.com/office/powerpoint/2010/main" val="4143062379"/>
+        <p14:creationId xmlns:p14="http://schemas.microsoft.com/office/powerpoint/2010/main" val="625277202"/>
       </p:ext>
     </p:extLst>
   </p:cSld>

</xml_diff>

<commit_message>
DD edits to second slide
</commit_message>
<xml_diff>
--- a/De La Riva, Bennett, Calhoun, Young; Tax_Boss.pptx
+++ b/De La Riva, Bennett, Calhoun, Young; Tax_Boss.pptx
@@ -17252,26 +17252,25 @@
           <a:p>
             <a:r>
               <a:rPr lang="en-US" sz="2000" dirty="0"/>
-              <a:t>Small business, only 4 employees, combined 50 years experience</a:t>
+              <a:t>Small business with 50 years of combined experience</a:t>
             </a:r>
           </a:p>
           <a:p>
             <a:r>
               <a:rPr lang="en-US" sz="2000" dirty="0"/>
-              <a:t>Previous projects</a:t>
+              <a:t>Have worked on several similar solutions for other small businesses</a:t>
             </a:r>
           </a:p>
           <a:p>
             <a:r>
               <a:rPr lang="en-US" sz="2000" dirty="0"/>
-              <a:t>-implemented similar solutions for legal firms, and other tax offices</a:t>
+              <a:t>We’ll do our best to provide you with the best IT solutions </a:t>
             </a:r>
-          </a:p>
-          <a:p>
             <a:r>
-              <a:rPr lang="en-US" sz="2000" dirty="0"/>
-              <a:t>Maybe a mission statement</a:t>
+              <a:rPr lang="en-US" sz="2000"/>
+              <a:t>for your needs</a:t>
             </a:r>
+            <a:endParaRPr lang="en-US" sz="2000" dirty="0"/>
           </a:p>
         </p:txBody>
       </p:sp>
@@ -17420,55 +17419,6 @@
                                           <p:spTgt spid="3">
                                             <p:txEl>
                                               <p:pRg st="2" end="2"/>
-                                            </p:txEl>
-                                          </p:spTgt>
-                                        </p:tgtEl>
-                                        <p:attrNameLst>
-                                          <p:attrName>style.visibility</p:attrName>
-                                        </p:attrNameLst>
-                                      </p:cBhvr>
-                                      <p:to>
-                                        <p:strVal val="visible"/>
-                                      </p:to>
-                                    </p:set>
-                                  </p:childTnLst>
-                                </p:cTn>
-                              </p:par>
-                            </p:childTnLst>
-                          </p:cTn>
-                        </p:par>
-                      </p:childTnLst>
-                    </p:cTn>
-                  </p:par>
-                  <p:par>
-                    <p:cTn id="15" fill="hold">
-                      <p:stCondLst>
-                        <p:cond delay="indefinite"/>
-                      </p:stCondLst>
-                      <p:childTnLst>
-                        <p:par>
-                          <p:cTn id="16" fill="hold">
-                            <p:stCondLst>
-                              <p:cond delay="0"/>
-                            </p:stCondLst>
-                            <p:childTnLst>
-                              <p:par>
-                                <p:cTn id="17" presetID="1" presetClass="entr" presetSubtype="0" fill="hold" grpId="0" nodeType="clickEffect">
-                                  <p:stCondLst>
-                                    <p:cond delay="0"/>
-                                  </p:stCondLst>
-                                  <p:childTnLst>
-                                    <p:set>
-                                      <p:cBhvr>
-                                        <p:cTn id="18" dur="1" fill="hold">
-                                          <p:stCondLst>
-                                            <p:cond delay="0"/>
-                                          </p:stCondLst>
-                                        </p:cTn>
-                                        <p:tgtEl>
-                                          <p:spTgt spid="3">
-                                            <p:txEl>
-                                              <p:pRg st="3" end="3"/>
                                             </p:txEl>
                                           </p:spTgt>
                                         </p:tgtEl>

</xml_diff>